<commit_message>
PRIMERA MODIFICACION DE PLANTILLA
</commit_message>
<xml_diff>
--- a/PLANTILLA_PRESENTACION_AVANCES_PROYECTO_.pptx
+++ b/PLANTILLA_PRESENTACION_AVANCES_PROYECTO_.pptx
@@ -5,7 +5,7 @@
     <p:sldMasterId id="2147483648" r:id="rId1"/>
   </p:sldMasterIdLst>
   <p:notesMasterIdLst>
-    <p:notesMasterId r:id="rId8"/>
+    <p:notesMasterId r:id="rId11"/>
   </p:notesMasterIdLst>
   <p:sldIdLst>
     <p:sldId id="257" r:id="rId2"/>
@@ -13,7 +13,10 @@
     <p:sldId id="276" r:id="rId4"/>
     <p:sldId id="258" r:id="rId5"/>
     <p:sldId id="263" r:id="rId6"/>
-    <p:sldId id="273" r:id="rId7"/>
+    <p:sldId id="278" r:id="rId7"/>
+    <p:sldId id="279" r:id="rId8"/>
+    <p:sldId id="277" r:id="rId9"/>
+    <p:sldId id="273" r:id="rId10"/>
   </p:sldIdLst>
   <p:sldSz cx="12192000" cy="6858000"/>
   <p:notesSz cx="6858000" cy="9144000"/>
@@ -202,7 +205,7 @@
           <a:p>
             <a:fld id="{9F8AA230-26E9-4845-90B2-987FEDAD6952}" type="datetimeFigureOut">
               <a:rPr lang="es-CO" smtClean="0"/>
-              <a:t>31/05/2020</a:t>
+              <a:t>2/12/2021</a:t>
             </a:fld>
             <a:endParaRPr lang="es-CO"/>
           </a:p>
@@ -997,10 +1000,10 @@
               <a:buChar char="-"/>
             </a:pPr>
             <a:r>
-              <a:rPr lang="es-ES"/>
+              <a:rPr lang="es-ES" dirty="0"/>
               <a:t>Escriba en esta diapositiva el titulo de la presentación y si lo desea puede agregar los temas que va exponer.</a:t>
             </a:r>
-            <a:endParaRPr/>
+            <a:endParaRPr dirty="0"/>
           </a:p>
           <a:p>
             <a:pPr marL="171450" lvl="0" indent="-171450" algn="l" rtl="0">
@@ -1021,10 +1024,10 @@
               <a:buChar char="-"/>
             </a:pPr>
             <a:r>
-              <a:rPr lang="es-ES"/>
+              <a:rPr lang="es-ES" dirty="0"/>
               <a:t>Si va a dejar solo el titulo déjelo centrado en la diapositiva.</a:t>
             </a:r>
-            <a:endParaRPr/>
+            <a:endParaRPr dirty="0"/>
           </a:p>
           <a:p>
             <a:pPr marL="171450" lvl="0" indent="-171450" algn="l" rtl="0">
@@ -1045,10 +1048,10 @@
               <a:buChar char="-"/>
             </a:pPr>
             <a:r>
-              <a:rPr lang="es-ES"/>
+              <a:rPr lang="es-ES" dirty="0"/>
               <a:t>Los textos deben ir en color blanco en tipografía Arial.</a:t>
             </a:r>
-            <a:endParaRPr/>
+            <a:endParaRPr dirty="0"/>
           </a:p>
         </p:txBody>
       </p:sp>
@@ -1225,10 +1228,10 @@
               <a:buChar char="-"/>
             </a:pPr>
             <a:r>
-              <a:rPr lang="es-ES"/>
+              <a:rPr lang="es-ES" dirty="0"/>
               <a:t>En esta diapositiva puede colocar contenidos y acompañarlos con una fotografía.</a:t>
             </a:r>
-            <a:endParaRPr/>
+            <a:endParaRPr dirty="0"/>
           </a:p>
           <a:p>
             <a:pPr marL="171450" lvl="0" indent="-171450" algn="l" rtl="0">
@@ -1249,10 +1252,10 @@
               <a:buChar char="-"/>
             </a:pPr>
             <a:r>
-              <a:rPr lang="es-ES"/>
+              <a:rPr lang="es-ES" dirty="0"/>
               <a:t>Los textos deben ir en azul (utilice el azul que aparece en la opciones de color de letra - -&gt; colores recientes) en tipografía Arial y justificados.</a:t>
             </a:r>
-            <a:endParaRPr/>
+            <a:endParaRPr dirty="0"/>
           </a:p>
         </p:txBody>
       </p:sp>
@@ -1429,10 +1432,10 @@
               <a:buChar char="-"/>
             </a:pPr>
             <a:r>
-              <a:rPr lang="es-ES"/>
+              <a:rPr lang="es-ES" dirty="0"/>
               <a:t>Utilice esta diapositiva si necesita incluir textos más extensos.</a:t>
             </a:r>
-            <a:endParaRPr/>
+            <a:endParaRPr dirty="0"/>
           </a:p>
           <a:p>
             <a:pPr marL="171450" lvl="0" indent="-171450" algn="l" rtl="0">
@@ -1453,10 +1456,10 @@
               <a:buChar char="-"/>
             </a:pPr>
             <a:r>
-              <a:rPr lang="es-ES"/>
+              <a:rPr lang="es-ES" dirty="0"/>
               <a:t>Los textos deben ir en azul (utilice el azul que aparece en la opciones de color de letra - -&gt; colores recientes) en tipografía Arial y justificados.</a:t>
             </a:r>
-            <a:endParaRPr/>
+            <a:endParaRPr dirty="0"/>
           </a:p>
           <a:p>
             <a:pPr marL="171450" lvl="0" indent="-171450" algn="l" rtl="0">
@@ -1477,10 +1480,10 @@
               <a:buChar char="-"/>
             </a:pPr>
             <a:r>
-              <a:rPr lang="es-ES"/>
+              <a:rPr lang="es-ES" dirty="0"/>
               <a:t>Asegúrese que los textos no se monten sobre la franja verde.</a:t>
             </a:r>
-            <a:endParaRPr/>
+            <a:endParaRPr dirty="0"/>
           </a:p>
         </p:txBody>
       </p:sp>
@@ -1547,7 +1550,7 @@
   <p:cSld>
     <p:spTree>
       <p:nvGrpSpPr>
-        <p:cNvPr id="1" name="Shape 186"/>
+        <p:cNvPr id="1" name="Shape 121"/>
         <p:cNvGrpSpPr/>
         <p:nvPr/>
       </p:nvGrpSpPr>
@@ -1561,7 +1564,7 @@
       </p:grpSpPr>
       <p:sp>
         <p:nvSpPr>
-          <p:cNvPr id="187" name="Google Shape;187;p8:notes"/>
+          <p:cNvPr id="122" name="Google Shape;122;p5:notes"/>
           <p:cNvSpPr>
             <a:spLocks noGrp="1" noRot="1" noChangeAspect="1"/>
           </p:cNvSpPr>
@@ -1612,7 +1615,7 @@
       </p:sp>
       <p:sp>
         <p:nvSpPr>
-          <p:cNvPr id="188" name="Google Shape;188;p8:notes"/>
+          <p:cNvPr id="123" name="Google Shape;123;p5:notes"/>
           <p:cNvSpPr txBox="1">
             <a:spLocks noGrp="1"/>
           </p:cNvSpPr>
@@ -1657,10 +1660,10 @@
               <a:buChar char="-"/>
             </a:pPr>
             <a:r>
-              <a:rPr lang="es-ES"/>
-              <a:t>Utilice esta diapositiva al final de su presentación</a:t>
-            </a:r>
-            <a:endParaRPr/>
+              <a:rPr lang="es-ES" dirty="0"/>
+              <a:t>Utilice esta diapositiva si necesita incluir textos más extensos.</a:t>
+            </a:r>
+            <a:endParaRPr dirty="0"/>
           </a:p>
           <a:p>
             <a:pPr marL="171450" lvl="0" indent="-171450" algn="l" rtl="0">
@@ -1681,16 +1684,40 @@
               <a:buChar char="-"/>
             </a:pPr>
             <a:r>
-              <a:rPr lang="es-ES"/>
-              <a:t>Esta diapositiva no debe modificarse</a:t>
-            </a:r>
-            <a:endParaRPr/>
-          </a:p>
-        </p:txBody>
-      </p:sp>
-      <p:sp>
-        <p:nvSpPr>
-          <p:cNvPr id="189" name="Google Shape;189;p8:notes"/>
+              <a:rPr lang="es-ES" dirty="0"/>
+              <a:t>Los textos deben ir en azul (utilice el azul que aparece en la opciones de color de letra - -&gt; colores recientes) en tipografía Arial y justificados.</a:t>
+            </a:r>
+            <a:endParaRPr dirty="0"/>
+          </a:p>
+          <a:p>
+            <a:pPr marL="171450" lvl="0" indent="-171450" algn="l" rtl="0">
+              <a:lnSpc>
+                <a:spcPct val="100000"/>
+              </a:lnSpc>
+              <a:spcBef>
+                <a:spcPts val="0"/>
+              </a:spcBef>
+              <a:spcAft>
+                <a:spcPts val="0"/>
+              </a:spcAft>
+              <a:buClr>
+                <a:schemeClr val="dk1"/>
+              </a:buClr>
+              <a:buSzPts val="1200"/>
+              <a:buFont typeface="Calibri"/>
+              <a:buChar char="-"/>
+            </a:pPr>
+            <a:r>
+              <a:rPr lang="es-ES" dirty="0"/>
+              <a:t>Asegúrese que los textos no se monten sobre la franja verde.</a:t>
+            </a:r>
+            <a:endParaRPr dirty="0"/>
+          </a:p>
+        </p:txBody>
+      </p:sp>
+      <p:sp>
+        <p:nvSpPr>
+          <p:cNvPr id="124" name="Google Shape;124;p5:notes"/>
           <p:cNvSpPr txBox="1">
             <a:spLocks noGrp="1"/>
           </p:cNvSpPr>
@@ -1733,6 +1760,424 @@
             <a:fld id="{00000000-1234-1234-1234-123412341234}" type="slidenum">
               <a:rPr lang="es-ES"/>
               <a:t>6</a:t>
+            </a:fld>
+            <a:endParaRPr/>
+          </a:p>
+        </p:txBody>
+      </p:sp>
+    </p:spTree>
+    <p:extLst>
+      <p:ext uri="{BB962C8B-B14F-4D97-AF65-F5344CB8AC3E}">
+        <p14:creationId xmlns:p14="http://schemas.microsoft.com/office/powerpoint/2010/main" val="810590773"/>
+      </p:ext>
+    </p:extLst>
+  </p:cSld>
+  <p:clrMapOvr>
+    <a:masterClrMapping/>
+  </p:clrMapOvr>
+</p:notes>
+</file>
+
+<file path=ppt/notesSlides/notesSlide7.xml><?xml version="1.0" encoding="utf-8"?>
+<p:notes xmlns:a="http://schemas.openxmlformats.org/drawingml/2006/main" xmlns:r="http://schemas.openxmlformats.org/officeDocument/2006/relationships" xmlns:p="http://schemas.openxmlformats.org/presentationml/2006/main" showMasterSp="0" showMasterPhAnim="0">
+  <p:cSld>
+    <p:spTree>
+      <p:nvGrpSpPr>
+        <p:cNvPr id="1" name="Shape 83"/>
+        <p:cNvGrpSpPr/>
+        <p:nvPr/>
+      </p:nvGrpSpPr>
+      <p:grpSpPr>
+        <a:xfrm>
+          <a:off x="0" y="0"/>
+          <a:ext cx="0" cy="0"/>
+          <a:chOff x="0" y="0"/>
+          <a:chExt cx="0" cy="0"/>
+        </a:xfrm>
+      </p:grpSpPr>
+      <p:sp>
+        <p:nvSpPr>
+          <p:cNvPr id="84" name="Google Shape;84;p3:notes"/>
+          <p:cNvSpPr>
+            <a:spLocks noGrp="1" noRot="1" noChangeAspect="1"/>
+          </p:cNvSpPr>
+          <p:nvPr>
+            <p:ph type="sldImg" idx="2"/>
+          </p:nvPr>
+        </p:nvSpPr>
+        <p:spPr>
+          <a:xfrm>
+            <a:off x="381000" y="685800"/>
+            <a:ext cx="6096000" cy="3429000"/>
+          </a:xfrm>
+          <a:custGeom>
+            <a:avLst/>
+            <a:gdLst/>
+            <a:ahLst/>
+            <a:cxnLst/>
+            <a:rect l="l" t="t" r="r" b="b"/>
+            <a:pathLst>
+              <a:path w="120000" h="120000" extrusionOk="0">
+                <a:moveTo>
+                  <a:pt x="0" y="0"/>
+                </a:moveTo>
+                <a:lnTo>
+                  <a:pt x="120000" y="0"/>
+                </a:lnTo>
+                <a:lnTo>
+                  <a:pt x="120000" y="120000"/>
+                </a:lnTo>
+                <a:lnTo>
+                  <a:pt x="0" y="120000"/>
+                </a:lnTo>
+                <a:close/>
+              </a:path>
+            </a:pathLst>
+          </a:custGeom>
+          <a:noFill/>
+          <a:ln w="12700" cap="flat" cmpd="sng">
+            <a:solidFill>
+              <a:srgbClr val="000000"/>
+            </a:solidFill>
+            <a:prstDash val="solid"/>
+            <a:round/>
+            <a:headEnd type="none" w="sm" len="sm"/>
+            <a:tailEnd type="none" w="sm" len="sm"/>
+          </a:ln>
+        </p:spPr>
+      </p:sp>
+      <p:sp>
+        <p:nvSpPr>
+          <p:cNvPr id="85" name="Google Shape;85;p3:notes"/>
+          <p:cNvSpPr txBox="1">
+            <a:spLocks noGrp="1"/>
+          </p:cNvSpPr>
+          <p:nvPr>
+            <p:ph type="body" idx="1"/>
+          </p:nvPr>
+        </p:nvSpPr>
+        <p:spPr>
+          <a:xfrm>
+            <a:off x="685800" y="4343400"/>
+            <a:ext cx="5486400" cy="4114800"/>
+          </a:xfrm>
+          <a:prstGeom prst="rect">
+            <a:avLst/>
+          </a:prstGeom>
+          <a:noFill/>
+          <a:ln>
+            <a:noFill/>
+          </a:ln>
+        </p:spPr>
+        <p:txBody>
+          <a:bodyPr spcFirstLastPara="1" wrap="square" lIns="91425" tIns="45700" rIns="91425" bIns="45700" anchor="t" anchorCtr="0">
+            <a:noAutofit/>
+          </a:bodyPr>
+          <a:lstStyle/>
+          <a:p>
+            <a:pPr marL="171450" lvl="0" indent="-171450" algn="l" rtl="0">
+              <a:lnSpc>
+                <a:spcPct val="100000"/>
+              </a:lnSpc>
+              <a:spcBef>
+                <a:spcPts val="0"/>
+              </a:spcBef>
+              <a:spcAft>
+                <a:spcPts val="0"/>
+              </a:spcAft>
+              <a:buClr>
+                <a:schemeClr val="dk1"/>
+              </a:buClr>
+              <a:buSzPts val="1200"/>
+              <a:buFont typeface="Calibri"/>
+              <a:buChar char="-"/>
+            </a:pPr>
+            <a:r>
+              <a:rPr lang="es-ES" dirty="0"/>
+              <a:t>En esta diapositiva puede colocar contenidos y acompañarlos con una fotografía.</a:t>
+            </a:r>
+            <a:endParaRPr dirty="0"/>
+          </a:p>
+          <a:p>
+            <a:pPr marL="171450" lvl="0" indent="-171450" algn="l" rtl="0">
+              <a:lnSpc>
+                <a:spcPct val="100000"/>
+              </a:lnSpc>
+              <a:spcBef>
+                <a:spcPts val="0"/>
+              </a:spcBef>
+              <a:spcAft>
+                <a:spcPts val="0"/>
+              </a:spcAft>
+              <a:buClr>
+                <a:schemeClr val="dk1"/>
+              </a:buClr>
+              <a:buSzPts val="1200"/>
+              <a:buFont typeface="Calibri"/>
+              <a:buChar char="-"/>
+            </a:pPr>
+            <a:r>
+              <a:rPr lang="es-ES" dirty="0"/>
+              <a:t>Los textos deben ir en azul (utilice el azul que aparece en la opciones de color de letra - -&gt; colores recientes) en tipografía Arial y justificados.</a:t>
+            </a:r>
+            <a:endParaRPr dirty="0"/>
+          </a:p>
+        </p:txBody>
+      </p:sp>
+      <p:sp>
+        <p:nvSpPr>
+          <p:cNvPr id="86" name="Google Shape;86;p3:notes"/>
+          <p:cNvSpPr txBox="1">
+            <a:spLocks noGrp="1"/>
+          </p:cNvSpPr>
+          <p:nvPr>
+            <p:ph type="sldNum" idx="12"/>
+          </p:nvPr>
+        </p:nvSpPr>
+        <p:spPr>
+          <a:xfrm>
+            <a:off x="3884613" y="8685213"/>
+            <a:ext cx="2971800" cy="457200"/>
+          </a:xfrm>
+          <a:prstGeom prst="rect">
+            <a:avLst/>
+          </a:prstGeom>
+          <a:noFill/>
+          <a:ln>
+            <a:noFill/>
+          </a:ln>
+        </p:spPr>
+        <p:txBody>
+          <a:bodyPr spcFirstLastPara="1" wrap="square" lIns="91425" tIns="45700" rIns="91425" bIns="45700" anchor="b" anchorCtr="0">
+            <a:noAutofit/>
+          </a:bodyPr>
+          <a:lstStyle/>
+          <a:p>
+            <a:pPr marL="0" lvl="0" indent="0" algn="r" rtl="0">
+              <a:lnSpc>
+                <a:spcPct val="100000"/>
+              </a:lnSpc>
+              <a:spcBef>
+                <a:spcPts val="0"/>
+              </a:spcBef>
+              <a:spcAft>
+                <a:spcPts val="0"/>
+              </a:spcAft>
+              <a:buSzPts val="1400"/>
+              <a:buNone/>
+            </a:pPr>
+            <a:fld id="{00000000-1234-1234-1234-123412341234}" type="slidenum">
+              <a:rPr lang="es-ES"/>
+              <a:t>8</a:t>
+            </a:fld>
+            <a:endParaRPr/>
+          </a:p>
+        </p:txBody>
+      </p:sp>
+    </p:spTree>
+    <p:extLst>
+      <p:ext uri="{BB962C8B-B14F-4D97-AF65-F5344CB8AC3E}">
+        <p14:creationId xmlns:p14="http://schemas.microsoft.com/office/powerpoint/2010/main" val="2153105857"/>
+      </p:ext>
+    </p:extLst>
+  </p:cSld>
+  <p:clrMapOvr>
+    <a:masterClrMapping/>
+  </p:clrMapOvr>
+</p:notes>
+</file>
+
+<file path=ppt/notesSlides/notesSlide8.xml><?xml version="1.0" encoding="utf-8"?>
+<p:notes xmlns:a="http://schemas.openxmlformats.org/drawingml/2006/main" xmlns:r="http://schemas.openxmlformats.org/officeDocument/2006/relationships" xmlns:p="http://schemas.openxmlformats.org/presentationml/2006/main" showMasterSp="0" showMasterPhAnim="0">
+  <p:cSld>
+    <p:spTree>
+      <p:nvGrpSpPr>
+        <p:cNvPr id="1" name="Shape 186"/>
+        <p:cNvGrpSpPr/>
+        <p:nvPr/>
+      </p:nvGrpSpPr>
+      <p:grpSpPr>
+        <a:xfrm>
+          <a:off x="0" y="0"/>
+          <a:ext cx="0" cy="0"/>
+          <a:chOff x="0" y="0"/>
+          <a:chExt cx="0" cy="0"/>
+        </a:xfrm>
+      </p:grpSpPr>
+      <p:sp>
+        <p:nvSpPr>
+          <p:cNvPr id="187" name="Google Shape;187;p8:notes"/>
+          <p:cNvSpPr>
+            <a:spLocks noGrp="1" noRot="1" noChangeAspect="1"/>
+          </p:cNvSpPr>
+          <p:nvPr>
+            <p:ph type="sldImg" idx="2"/>
+          </p:nvPr>
+        </p:nvSpPr>
+        <p:spPr>
+          <a:xfrm>
+            <a:off x="381000" y="685800"/>
+            <a:ext cx="6096000" cy="3429000"/>
+          </a:xfrm>
+          <a:custGeom>
+            <a:avLst/>
+            <a:gdLst/>
+            <a:ahLst/>
+            <a:cxnLst/>
+            <a:rect l="l" t="t" r="r" b="b"/>
+            <a:pathLst>
+              <a:path w="120000" h="120000" extrusionOk="0">
+                <a:moveTo>
+                  <a:pt x="0" y="0"/>
+                </a:moveTo>
+                <a:lnTo>
+                  <a:pt x="120000" y="0"/>
+                </a:lnTo>
+                <a:lnTo>
+                  <a:pt x="120000" y="120000"/>
+                </a:lnTo>
+                <a:lnTo>
+                  <a:pt x="0" y="120000"/>
+                </a:lnTo>
+                <a:close/>
+              </a:path>
+            </a:pathLst>
+          </a:custGeom>
+          <a:noFill/>
+          <a:ln w="12700" cap="flat" cmpd="sng">
+            <a:solidFill>
+              <a:srgbClr val="000000"/>
+            </a:solidFill>
+            <a:prstDash val="solid"/>
+            <a:round/>
+            <a:headEnd type="none" w="sm" len="sm"/>
+            <a:tailEnd type="none" w="sm" len="sm"/>
+          </a:ln>
+        </p:spPr>
+      </p:sp>
+      <p:sp>
+        <p:nvSpPr>
+          <p:cNvPr id="188" name="Google Shape;188;p8:notes"/>
+          <p:cNvSpPr txBox="1">
+            <a:spLocks noGrp="1"/>
+          </p:cNvSpPr>
+          <p:nvPr>
+            <p:ph type="body" idx="1"/>
+          </p:nvPr>
+        </p:nvSpPr>
+        <p:spPr>
+          <a:xfrm>
+            <a:off x="685800" y="4343400"/>
+            <a:ext cx="5486400" cy="4114800"/>
+          </a:xfrm>
+          <a:prstGeom prst="rect">
+            <a:avLst/>
+          </a:prstGeom>
+          <a:noFill/>
+          <a:ln>
+            <a:noFill/>
+          </a:ln>
+        </p:spPr>
+        <p:txBody>
+          <a:bodyPr spcFirstLastPara="1" wrap="square" lIns="91425" tIns="45700" rIns="91425" bIns="45700" anchor="t" anchorCtr="0">
+            <a:noAutofit/>
+          </a:bodyPr>
+          <a:lstStyle/>
+          <a:p>
+            <a:pPr marL="171450" lvl="0" indent="-171450" algn="l" rtl="0">
+              <a:lnSpc>
+                <a:spcPct val="100000"/>
+              </a:lnSpc>
+              <a:spcBef>
+                <a:spcPts val="0"/>
+              </a:spcBef>
+              <a:spcAft>
+                <a:spcPts val="0"/>
+              </a:spcAft>
+              <a:buClr>
+                <a:schemeClr val="dk1"/>
+              </a:buClr>
+              <a:buSzPts val="1200"/>
+              <a:buFont typeface="Calibri"/>
+              <a:buChar char="-"/>
+            </a:pPr>
+            <a:r>
+              <a:rPr lang="es-ES"/>
+              <a:t>Utilice esta diapositiva al final de su presentación</a:t>
+            </a:r>
+            <a:endParaRPr/>
+          </a:p>
+          <a:p>
+            <a:pPr marL="171450" lvl="0" indent="-171450" algn="l" rtl="0">
+              <a:lnSpc>
+                <a:spcPct val="100000"/>
+              </a:lnSpc>
+              <a:spcBef>
+                <a:spcPts val="0"/>
+              </a:spcBef>
+              <a:spcAft>
+                <a:spcPts val="0"/>
+              </a:spcAft>
+              <a:buClr>
+                <a:schemeClr val="dk1"/>
+              </a:buClr>
+              <a:buSzPts val="1200"/>
+              <a:buFont typeface="Calibri"/>
+              <a:buChar char="-"/>
+            </a:pPr>
+            <a:r>
+              <a:rPr lang="es-ES"/>
+              <a:t>Esta diapositiva no debe modificarse</a:t>
+            </a:r>
+            <a:endParaRPr/>
+          </a:p>
+        </p:txBody>
+      </p:sp>
+      <p:sp>
+        <p:nvSpPr>
+          <p:cNvPr id="189" name="Google Shape;189;p8:notes"/>
+          <p:cNvSpPr txBox="1">
+            <a:spLocks noGrp="1"/>
+          </p:cNvSpPr>
+          <p:nvPr>
+            <p:ph type="sldNum" idx="12"/>
+          </p:nvPr>
+        </p:nvSpPr>
+        <p:spPr>
+          <a:xfrm>
+            <a:off x="3884613" y="8685213"/>
+            <a:ext cx="2971800" cy="457200"/>
+          </a:xfrm>
+          <a:prstGeom prst="rect">
+            <a:avLst/>
+          </a:prstGeom>
+          <a:noFill/>
+          <a:ln>
+            <a:noFill/>
+          </a:ln>
+        </p:spPr>
+        <p:txBody>
+          <a:bodyPr spcFirstLastPara="1" wrap="square" lIns="91425" tIns="45700" rIns="91425" bIns="45700" anchor="b" anchorCtr="0">
+            <a:noAutofit/>
+          </a:bodyPr>
+          <a:lstStyle/>
+          <a:p>
+            <a:pPr marL="0" lvl="0" indent="0" algn="r" rtl="0">
+              <a:lnSpc>
+                <a:spcPct val="100000"/>
+              </a:lnSpc>
+              <a:spcBef>
+                <a:spcPts val="0"/>
+              </a:spcBef>
+              <a:spcAft>
+                <a:spcPts val="0"/>
+              </a:spcAft>
+              <a:buSzPts val="1400"/>
+              <a:buNone/>
+            </a:pPr>
+            <a:fld id="{00000000-1234-1234-1234-123412341234}" type="slidenum">
+              <a:rPr lang="es-ES"/>
+              <a:t>9</a:t>
             </a:fld>
             <a:endParaRPr/>
           </a:p>
@@ -1895,7 +2340,7 @@
           <a:p>
             <a:fld id="{45896B23-B6B7-4DC1-BF89-EF3D7CBACBEB}" type="datetimeFigureOut">
               <a:rPr lang="es-CO" smtClean="0"/>
-              <a:t>31/05/2020</a:t>
+              <a:t>2/12/2021</a:t>
             </a:fld>
             <a:endParaRPr lang="es-CO"/>
           </a:p>
@@ -2095,7 +2540,7 @@
           <a:p>
             <a:fld id="{45896B23-B6B7-4DC1-BF89-EF3D7CBACBEB}" type="datetimeFigureOut">
               <a:rPr lang="es-CO" smtClean="0"/>
-              <a:t>31/05/2020</a:t>
+              <a:t>2/12/2021</a:t>
             </a:fld>
             <a:endParaRPr lang="es-CO"/>
           </a:p>
@@ -2305,7 +2750,7 @@
           <a:p>
             <a:fld id="{45896B23-B6B7-4DC1-BF89-EF3D7CBACBEB}" type="datetimeFigureOut">
               <a:rPr lang="es-CO" smtClean="0"/>
-              <a:t>31/05/2020</a:t>
+              <a:t>2/12/2021</a:t>
             </a:fld>
             <a:endParaRPr lang="es-CO"/>
           </a:p>
@@ -2790,7 +3235,7 @@
           <a:p>
             <a:fld id="{45896B23-B6B7-4DC1-BF89-EF3D7CBACBEB}" type="datetimeFigureOut">
               <a:rPr lang="es-CO" smtClean="0"/>
-              <a:t>31/05/2020</a:t>
+              <a:t>2/12/2021</a:t>
             </a:fld>
             <a:endParaRPr lang="es-CO"/>
           </a:p>
@@ -3066,7 +3511,7 @@
           <a:p>
             <a:fld id="{45896B23-B6B7-4DC1-BF89-EF3D7CBACBEB}" type="datetimeFigureOut">
               <a:rPr lang="es-CO" smtClean="0"/>
-              <a:t>31/05/2020</a:t>
+              <a:t>2/12/2021</a:t>
             </a:fld>
             <a:endParaRPr lang="es-CO"/>
           </a:p>
@@ -3334,7 +3779,7 @@
           <a:p>
             <a:fld id="{45896B23-B6B7-4DC1-BF89-EF3D7CBACBEB}" type="datetimeFigureOut">
               <a:rPr lang="es-CO" smtClean="0"/>
-              <a:t>31/05/2020</a:t>
+              <a:t>2/12/2021</a:t>
             </a:fld>
             <a:endParaRPr lang="es-CO"/>
           </a:p>
@@ -3749,7 +4194,7 @@
           <a:p>
             <a:fld id="{45896B23-B6B7-4DC1-BF89-EF3D7CBACBEB}" type="datetimeFigureOut">
               <a:rPr lang="es-CO" smtClean="0"/>
-              <a:t>31/05/2020</a:t>
+              <a:t>2/12/2021</a:t>
             </a:fld>
             <a:endParaRPr lang="es-CO"/>
           </a:p>
@@ -3891,7 +4336,7 @@
           <a:p>
             <a:fld id="{45896B23-B6B7-4DC1-BF89-EF3D7CBACBEB}" type="datetimeFigureOut">
               <a:rPr lang="es-CO" smtClean="0"/>
-              <a:t>31/05/2020</a:t>
+              <a:t>2/12/2021</a:t>
             </a:fld>
             <a:endParaRPr lang="es-CO"/>
           </a:p>
@@ -4004,7 +4449,7 @@
           <a:p>
             <a:fld id="{45896B23-B6B7-4DC1-BF89-EF3D7CBACBEB}" type="datetimeFigureOut">
               <a:rPr lang="es-CO" smtClean="0"/>
-              <a:t>31/05/2020</a:t>
+              <a:t>2/12/2021</a:t>
             </a:fld>
             <a:endParaRPr lang="es-CO"/>
           </a:p>
@@ -4317,7 +4762,7 @@
           <a:p>
             <a:fld id="{45896B23-B6B7-4DC1-BF89-EF3D7CBACBEB}" type="datetimeFigureOut">
               <a:rPr lang="es-CO" smtClean="0"/>
-              <a:t>31/05/2020</a:t>
+              <a:t>2/12/2021</a:t>
             </a:fld>
             <a:endParaRPr lang="es-CO"/>
           </a:p>
@@ -4606,7 +5051,7 @@
           <a:p>
             <a:fld id="{45896B23-B6B7-4DC1-BF89-EF3D7CBACBEB}" type="datetimeFigureOut">
               <a:rPr lang="es-CO" smtClean="0"/>
-              <a:t>31/05/2020</a:t>
+              <a:t>2/12/2021</a:t>
             </a:fld>
             <a:endParaRPr lang="es-CO"/>
           </a:p>
@@ -4849,7 +5294,7 @@
           <a:p>
             <a:fld id="{45896B23-B6B7-4DC1-BF89-EF3D7CBACBEB}" type="datetimeFigureOut">
               <a:rPr lang="es-CO" smtClean="0"/>
-              <a:t>31/05/2020</a:t>
+              <a:t>2/12/2021</a:t>
             </a:fld>
             <a:endParaRPr lang="es-CO"/>
           </a:p>
@@ -5298,29 +5743,50 @@
       </p:grpSpPr>
       <p:pic>
         <p:nvPicPr>
-          <p:cNvPr id="84" name="Google Shape;84;p16" descr="EDITORIAL3.jpg"/>
-          <p:cNvPicPr preferRelativeResize="0"/>
+          <p:cNvPr id="7" name="Imagen 6">
+            <a:extLst>
+              <a:ext uri="{FF2B5EF4-FFF2-40B4-BE49-F238E27FC236}">
+                <a16:creationId xmlns:a16="http://schemas.microsoft.com/office/drawing/2014/main" id="{DD3201DB-B6BE-45AC-A418-E2FB8F804A52}"/>
+              </a:ext>
+            </a:extLst>
+          </p:cNvPr>
+          <p:cNvPicPr>
+            <a:picLocks noChangeAspect="1"/>
+          </p:cNvPicPr>
           <p:nvPr/>
         </p:nvPicPr>
-        <p:blipFill rotWithShape="1">
+        <p:blipFill>
           <a:blip r:embed="rId3">
-            <a:alphaModFix/>
+            <a:extLst>
+              <a:ext uri="{BEBA8EAE-BF5A-486C-A8C5-ECC9F3942E4B}">
+                <a14:imgProps xmlns:a14="http://schemas.microsoft.com/office/drawing/2010/main">
+                  <a14:imgLayer r:embed="rId4">
+                    <a14:imgEffect>
+                      <a14:colorTemperature colorTemp="5300"/>
+                    </a14:imgEffect>
+                    <a14:imgEffect>
+                      <a14:saturation sat="200000"/>
+                    </a14:imgEffect>
+                  </a14:imgLayer>
+                </a14:imgProps>
+              </a:ext>
+              <a:ext uri="{28A0092B-C50C-407E-A947-70E740481C1C}">
+                <a14:useLocalDpi xmlns:a14="http://schemas.microsoft.com/office/drawing/2010/main" val="0"/>
+              </a:ext>
+            </a:extLst>
           </a:blip>
-          <a:srcRect t="14950"/>
-          <a:stretch/>
+          <a:stretch>
+            <a:fillRect/>
+          </a:stretch>
         </p:blipFill>
         <p:spPr>
           <a:xfrm>
-            <a:off x="-54226" y="-57320"/>
-            <a:ext cx="12300451" cy="6972640"/>
+            <a:off x="-1" y="-1"/>
+            <a:ext cx="12192001" cy="6900203"/>
           </a:xfrm>
           <a:prstGeom prst="rect">
             <a:avLst/>
           </a:prstGeom>
-          <a:noFill/>
-          <a:ln>
-            <a:noFill/>
-          </a:ln>
         </p:spPr>
       </p:pic>
       <p:sp>
@@ -5390,7 +5856,7 @@
         </p:nvSpPr>
         <p:spPr>
           <a:xfrm>
-            <a:off x="7850796" y="1026665"/>
+            <a:off x="7639781" y="927790"/>
             <a:ext cx="3707024" cy="1217145"/>
           </a:xfrm>
           <a:prstGeom prst="rect">
@@ -5409,18 +5875,15 @@
           <a:p>
             <a:pPr algn="r"/>
             <a:r>
-              <a:rPr lang="es-ES" sz="3200" b="1" dirty="0">
+              <a:rPr lang="es-ES" sz="6000" b="1" dirty="0">
                 <a:solidFill>
-                  <a:schemeClr val="lt1"/>
+                  <a:schemeClr val="bg1"/>
                 </a:solidFill>
-                <a:latin typeface="Work Sans"/>
-                <a:ea typeface="Work Sans"/>
-                <a:cs typeface="Work Sans"/>
-                <a:sym typeface="Work Sans"/>
+                <a:latin typeface="Arial" panose="020B0604020202020204" pitchFamily="34" charset="0"/>
+                <a:cs typeface="Arial" panose="020B0604020202020204" pitchFamily="34" charset="0"/>
               </a:rPr>
-              <a:t>NOMBRE APLICACIÓN </a:t>
-            </a:r>
-            <a:endParaRPr sz="2400" dirty="0"/>
+              <a:t>NEARBY</a:t>
+            </a:r>
           </a:p>
         </p:txBody>
       </p:sp>
@@ -5432,8 +5895,8 @@
         </p:nvSpPr>
         <p:spPr>
           <a:xfrm>
-            <a:off x="9029614" y="2243810"/>
-            <a:ext cx="3115988" cy="779700"/>
+            <a:off x="6558606" y="2342685"/>
+            <a:ext cx="4999214" cy="3587525"/>
           </a:xfrm>
           <a:prstGeom prst="rect">
             <a:avLst/>
@@ -5451,48 +5914,141 @@
           <a:p>
             <a:pPr algn="r"/>
             <a:r>
-              <a:rPr lang="es-ES" sz="2133" dirty="0">
+              <a:rPr lang="es-ES" sz="2400" dirty="0">
                 <a:solidFill>
                   <a:schemeClr val="lt1"/>
                 </a:solidFill>
-                <a:latin typeface="Work Sans"/>
+                <a:latin typeface="Arial" panose="020B0604020202020204" pitchFamily="34" charset="0"/>
                 <a:ea typeface="Work Sans"/>
-                <a:cs typeface="Work Sans"/>
+                <a:cs typeface="Arial" panose="020B0604020202020204" pitchFamily="34" charset="0"/>
                 <a:sym typeface="Work Sans"/>
               </a:rPr>
-              <a:t>Sistema de XXXXXX</a:t>
-            </a:r>
+              <a:t>Sistema de :</a:t>
+            </a:r>
+          </a:p>
+          <a:p>
+            <a:pPr algn="r"/>
+            <a:r>
+              <a:rPr lang="es-ES" sz="2400" dirty="0">
+                <a:solidFill>
+                  <a:schemeClr val="lt1"/>
+                </a:solidFill>
+                <a:latin typeface="Arial" panose="020B0604020202020204" pitchFamily="34" charset="0"/>
+                <a:cs typeface="Arial" panose="020B0604020202020204" pitchFamily="34" charset="0"/>
+                <a:sym typeface="Work Sans"/>
+              </a:rPr>
+              <a:t>Angie Judith Echeverry</a:t>
+            </a:r>
+          </a:p>
+          <a:p>
+            <a:pPr algn="r"/>
+            <a:r>
+              <a:rPr lang="es-ES" sz="2400" dirty="0">
+                <a:solidFill>
+                  <a:schemeClr val="lt1"/>
+                </a:solidFill>
+                <a:latin typeface="Arial" panose="020B0604020202020204" pitchFamily="34" charset="0"/>
+                <a:cs typeface="Arial" panose="020B0604020202020204" pitchFamily="34" charset="0"/>
+                <a:sym typeface="Work Sans"/>
+              </a:rPr>
+              <a:t>Cristian </a:t>
+            </a:r>
+            <a:r>
+              <a:rPr lang="es-ES" sz="2400" dirty="0" err="1">
+                <a:solidFill>
+                  <a:schemeClr val="lt1"/>
+                </a:solidFill>
+                <a:latin typeface="Arial" panose="020B0604020202020204" pitchFamily="34" charset="0"/>
+                <a:cs typeface="Arial" panose="020B0604020202020204" pitchFamily="34" charset="0"/>
+                <a:sym typeface="Work Sans"/>
+              </a:rPr>
+              <a:t>Benitez</a:t>
+            </a:r>
+            <a:r>
+              <a:rPr lang="es-ES" sz="2400" dirty="0">
+                <a:solidFill>
+                  <a:schemeClr val="lt1"/>
+                </a:solidFill>
+                <a:latin typeface="Arial" panose="020B0604020202020204" pitchFamily="34" charset="0"/>
+                <a:cs typeface="Arial" panose="020B0604020202020204" pitchFamily="34" charset="0"/>
+                <a:sym typeface="Work Sans"/>
+              </a:rPr>
+              <a:t> Guevara</a:t>
+            </a:r>
+          </a:p>
+          <a:p>
+            <a:pPr algn="r"/>
+            <a:r>
+              <a:rPr lang="es-ES" sz="2400" dirty="0">
+                <a:solidFill>
+                  <a:schemeClr val="lt1"/>
+                </a:solidFill>
+                <a:latin typeface="Arial" panose="020B0604020202020204" pitchFamily="34" charset="0"/>
+                <a:cs typeface="Arial" panose="020B0604020202020204" pitchFamily="34" charset="0"/>
+                <a:sym typeface="Work Sans"/>
+              </a:rPr>
+              <a:t>Harold Daniel Vargas Quintero</a:t>
+            </a:r>
+          </a:p>
+          <a:p>
+            <a:pPr algn="r"/>
+            <a:r>
+              <a:rPr lang="es-ES" sz="2400" dirty="0">
+                <a:solidFill>
+                  <a:schemeClr val="lt1"/>
+                </a:solidFill>
+                <a:latin typeface="Arial" panose="020B0604020202020204" pitchFamily="34" charset="0"/>
+                <a:cs typeface="Arial" panose="020B0604020202020204" pitchFamily="34" charset="0"/>
+                <a:sym typeface="Work Sans"/>
+              </a:rPr>
+              <a:t>Juan Esteban Arenas Padua</a:t>
+            </a:r>
+          </a:p>
+          <a:p>
+            <a:pPr algn="r"/>
+            <a:r>
+              <a:rPr lang="es-ES" sz="2400" dirty="0">
+                <a:solidFill>
+                  <a:schemeClr val="lt1"/>
+                </a:solidFill>
+                <a:latin typeface="Arial" panose="020B0604020202020204" pitchFamily="34" charset="0"/>
+                <a:cs typeface="Arial" panose="020B0604020202020204" pitchFamily="34" charset="0"/>
+                <a:sym typeface="Work Sans"/>
+              </a:rPr>
+              <a:t>Deivid Daniel Celis Paredes</a:t>
+            </a:r>
+          </a:p>
+          <a:p>
+            <a:pPr algn="r"/>
+            <a:r>
+              <a:rPr lang="es-ES" sz="2400" dirty="0" err="1">
+                <a:solidFill>
+                  <a:schemeClr val="lt1"/>
+                </a:solidFill>
+                <a:latin typeface="Arial" panose="020B0604020202020204" pitchFamily="34" charset="0"/>
+                <a:cs typeface="Arial" panose="020B0604020202020204" pitchFamily="34" charset="0"/>
+                <a:sym typeface="Work Sans"/>
+              </a:rPr>
+              <a:t>Julian</a:t>
+            </a:r>
+            <a:r>
+              <a:rPr lang="es-ES" sz="2400" dirty="0">
+                <a:solidFill>
+                  <a:schemeClr val="lt1"/>
+                </a:solidFill>
+                <a:latin typeface="Arial" panose="020B0604020202020204" pitchFamily="34" charset="0"/>
+                <a:cs typeface="Arial" panose="020B0604020202020204" pitchFamily="34" charset="0"/>
+                <a:sym typeface="Work Sans"/>
+              </a:rPr>
+              <a:t> David Forero Estrada </a:t>
+            </a:r>
+          </a:p>
+          <a:p>
+            <a:pPr algn="r"/>
             <a:endParaRPr sz="2400" dirty="0"/>
           </a:p>
         </p:txBody>
       </p:sp>
-      <p:pic>
-        <p:nvPicPr>
-          <p:cNvPr id="88" name="Google Shape;88;p16"/>
-          <p:cNvPicPr preferRelativeResize="0"/>
-          <p:nvPr/>
-        </p:nvPicPr>
-        <p:blipFill rotWithShape="1">
-          <a:blip r:embed="rId4">
-            <a:alphaModFix/>
-          </a:blip>
-          <a:srcRect/>
-          <a:stretch/>
-        </p:blipFill>
-        <p:spPr>
-          <a:xfrm rot="10800000" flipH="1">
-            <a:off x="9663443" y="1489999"/>
-            <a:ext cx="1748836" cy="60959"/>
-          </a:xfrm>
-          <a:prstGeom prst="rect">
-            <a:avLst/>
-          </a:prstGeom>
-          <a:noFill/>
-          <a:ln>
-            <a:noFill/>
-          </a:ln>
-        </p:spPr>
-      </p:pic>
       <p:pic>
         <p:nvPicPr>
           <p:cNvPr id="89" name="Google Shape;89;p16" descr="naranja.png"/>
@@ -5510,39 +6066,6 @@
           <a:xfrm>
             <a:off x="396273" y="387278"/>
             <a:ext cx="801836" cy="804925"/>
-          </a:xfrm>
-          <a:prstGeom prst="rect">
-            <a:avLst/>
-          </a:prstGeom>
-          <a:noFill/>
-          <a:ln>
-            <a:noFill/>
-          </a:ln>
-        </p:spPr>
-      </p:pic>
-      <p:pic>
-        <p:nvPicPr>
-          <p:cNvPr id="8" name="Google Shape;88;p16">
-            <a:extLst>
-              <a:ext uri="{FF2B5EF4-FFF2-40B4-BE49-F238E27FC236}">
-                <a16:creationId xmlns:a16="http://schemas.microsoft.com/office/drawing/2014/main" id="{9D3EEB45-2776-45AB-97A8-4BB73455660E}"/>
-              </a:ext>
-            </a:extLst>
-          </p:cNvPr>
-          <p:cNvPicPr preferRelativeResize="0"/>
-          <p:nvPr/>
-        </p:nvPicPr>
-        <p:blipFill rotWithShape="1">
-          <a:blip r:embed="rId4">
-            <a:alphaModFix/>
-          </a:blip>
-          <a:srcRect/>
-          <a:stretch/>
-        </p:blipFill>
-        <p:spPr>
-          <a:xfrm rot="10800000" flipH="1">
-            <a:off x="8838772" y="2105202"/>
-            <a:ext cx="2719049" cy="60959"/>
           </a:xfrm>
           <a:prstGeom prst="rect">
             <a:avLst/>
@@ -5580,47 +6103,378 @@
       </p:grpSpPr>
       <p:sp>
         <p:nvSpPr>
-          <p:cNvPr id="82" name="Google Shape;82;p2"/>
+          <p:cNvPr id="6" name="CuadroTexto 5">
+            <a:extLst>
+              <a:ext uri="{FF2B5EF4-FFF2-40B4-BE49-F238E27FC236}">
+                <a16:creationId xmlns:a16="http://schemas.microsoft.com/office/drawing/2014/main" id="{467AFED2-B661-43CF-B802-606A6A249BDD}"/>
+              </a:ext>
+            </a:extLst>
+          </p:cNvPr>
           <p:cNvSpPr txBox="1"/>
           <p:nvPr/>
         </p:nvSpPr>
         <p:spPr>
           <a:xfrm>
-            <a:off x="2250600" y="2990967"/>
-            <a:ext cx="6507600" cy="1998800"/>
+            <a:off x="886265" y="281354"/>
+            <a:ext cx="9355015" cy="584775"/>
           </a:xfrm>
           <a:prstGeom prst="rect">
             <a:avLst/>
           </a:prstGeom>
           <a:noFill/>
-          <a:ln>
-            <a:noFill/>
-          </a:ln>
         </p:spPr>
         <p:txBody>
-          <a:bodyPr spcFirstLastPara="1" wrap="square" lIns="121900" tIns="121900" rIns="121900" bIns="121900" anchor="t" anchorCtr="0">
-            <a:noAutofit/>
+          <a:bodyPr wrap="square" rtlCol="0">
+            <a:spAutoFit/>
           </a:bodyPr>
           <a:lstStyle/>
           <a:p>
-            <a:pPr algn="just">
-              <a:lnSpc>
-                <a:spcPct val="115000"/>
-              </a:lnSpc>
-              <a:buClr>
-                <a:srgbClr val="000000"/>
-              </a:buClr>
-              <a:buSzPts val="1800"/>
+            <a:pPr algn="ctr"/>
+            <a:r>
+              <a:rPr lang="es-ES" sz="3200" b="1" dirty="0">
+                <a:solidFill>
+                  <a:schemeClr val="bg1"/>
+                </a:solidFill>
+                <a:latin typeface="Arial" panose="020B0604020202020204" pitchFamily="34" charset="0"/>
+                <a:cs typeface="Arial" panose="020B0604020202020204" pitchFamily="34" charset="0"/>
+              </a:rPr>
+              <a:t>TABLA DE CONTENIDO </a:t>
+            </a:r>
+            <a:endParaRPr lang="es-CO" sz="3200" b="1" dirty="0">
+              <a:solidFill>
+                <a:schemeClr val="bg1"/>
+              </a:solidFill>
+              <a:latin typeface="Arial" panose="020B0604020202020204" pitchFamily="34" charset="0"/>
+              <a:cs typeface="Arial" panose="020B0604020202020204" pitchFamily="34" charset="0"/>
+            </a:endParaRPr>
+          </a:p>
+        </p:txBody>
+      </p:sp>
+      <p:sp>
+        <p:nvSpPr>
+          <p:cNvPr id="7" name="CuadroTexto 6">
+            <a:extLst>
+              <a:ext uri="{FF2B5EF4-FFF2-40B4-BE49-F238E27FC236}">
+                <a16:creationId xmlns:a16="http://schemas.microsoft.com/office/drawing/2014/main" id="{81449E7D-7336-438B-9C80-9086C5C87EDA}"/>
+              </a:ext>
+            </a:extLst>
+          </p:cNvPr>
+          <p:cNvSpPr txBox="1"/>
+          <p:nvPr/>
+        </p:nvSpPr>
+        <p:spPr>
+          <a:xfrm>
+            <a:off x="379827" y="948690"/>
+            <a:ext cx="9861453" cy="5909310"/>
+          </a:xfrm>
+          <a:prstGeom prst="rect">
+            <a:avLst/>
+          </a:prstGeom>
+          <a:noFill/>
+        </p:spPr>
+        <p:txBody>
+          <a:bodyPr wrap="square" rtlCol="0">
+            <a:spAutoFit/>
+          </a:bodyPr>
+          <a:lstStyle/>
+          <a:p>
+            <a:pPr marL="342900" indent="-342900">
+              <a:buAutoNum type="arabicParenR"/>
             </a:pPr>
-            <a:endParaRPr sz="2400" dirty="0">
+            <a:r>
+              <a:rPr lang="es-ES" b="1" dirty="0">
+                <a:solidFill>
+                  <a:schemeClr val="bg1"/>
+                </a:solidFill>
+                <a:latin typeface="Arial" panose="020B0604020202020204" pitchFamily="34" charset="0"/>
+                <a:cs typeface="Arial" panose="020B0604020202020204" pitchFamily="34" charset="0"/>
+              </a:rPr>
+              <a:t>Nombre y logo del proyecto</a:t>
+            </a:r>
+          </a:p>
+          <a:p>
+            <a:pPr marL="342900" indent="-342900">
+              <a:buAutoNum type="arabicParenR"/>
+            </a:pPr>
+            <a:endParaRPr lang="es-ES" b="1" dirty="0">
               <a:solidFill>
-                <a:srgbClr val="FFFFFF"/>
+                <a:schemeClr val="bg1"/>
               </a:solidFill>
-              <a:latin typeface="Arial"/>
-              <a:ea typeface="Arial"/>
-              <a:cs typeface="Arial"/>
-              <a:sym typeface="Arial"/>
+              <a:latin typeface="Arial" panose="020B0604020202020204" pitchFamily="34" charset="0"/>
+              <a:cs typeface="Arial" panose="020B0604020202020204" pitchFamily="34" charset="0"/>
             </a:endParaRPr>
+          </a:p>
+          <a:p>
+            <a:pPr marL="342900" indent="-342900">
+              <a:buAutoNum type="arabicParenR"/>
+            </a:pPr>
+            <a:r>
+              <a:rPr lang="es-ES" b="1" dirty="0">
+                <a:solidFill>
+                  <a:schemeClr val="bg1"/>
+                </a:solidFill>
+                <a:latin typeface="Arial" panose="020B0604020202020204" pitchFamily="34" charset="0"/>
+                <a:cs typeface="Arial" panose="020B0604020202020204" pitchFamily="34" charset="0"/>
+              </a:rPr>
+              <a:t>Información general del proyecto</a:t>
+            </a:r>
+          </a:p>
+          <a:p>
+            <a:pPr marL="285750" indent="-285750">
+              <a:buFont typeface="Arial" panose="020B0604020202020204" pitchFamily="34" charset="0"/>
+              <a:buChar char="•"/>
+            </a:pPr>
+            <a:r>
+              <a:rPr lang="es-ES" dirty="0">
+                <a:solidFill>
+                  <a:schemeClr val="bg1"/>
+                </a:solidFill>
+                <a:latin typeface="Arial" panose="020B0604020202020204" pitchFamily="34" charset="0"/>
+                <a:cs typeface="Arial" panose="020B0604020202020204" pitchFamily="34" charset="0"/>
+              </a:rPr>
+              <a:t>Planteamiento del problema</a:t>
+            </a:r>
+          </a:p>
+          <a:p>
+            <a:pPr marL="285750" indent="-285750">
+              <a:buFont typeface="Arial" panose="020B0604020202020204" pitchFamily="34" charset="0"/>
+              <a:buChar char="•"/>
+            </a:pPr>
+            <a:r>
+              <a:rPr lang="es-ES" dirty="0">
+                <a:solidFill>
+                  <a:schemeClr val="bg1"/>
+                </a:solidFill>
+                <a:latin typeface="Arial" panose="020B0604020202020204" pitchFamily="34" charset="0"/>
+                <a:cs typeface="Arial" panose="020B0604020202020204" pitchFamily="34" charset="0"/>
+              </a:rPr>
+              <a:t>Objetivo general</a:t>
+            </a:r>
+          </a:p>
+          <a:p>
+            <a:pPr marL="285750" indent="-285750">
+              <a:buFont typeface="Arial" panose="020B0604020202020204" pitchFamily="34" charset="0"/>
+              <a:buChar char="•"/>
+            </a:pPr>
+            <a:r>
+              <a:rPr lang="es-ES" dirty="0">
+                <a:solidFill>
+                  <a:schemeClr val="bg1"/>
+                </a:solidFill>
+                <a:latin typeface="Arial" panose="020B0604020202020204" pitchFamily="34" charset="0"/>
+                <a:cs typeface="Arial" panose="020B0604020202020204" pitchFamily="34" charset="0"/>
+              </a:rPr>
+              <a:t>Objetivos específicos </a:t>
+            </a:r>
+          </a:p>
+          <a:p>
+            <a:pPr marL="285750" indent="-285750">
+              <a:buFont typeface="Arial" panose="020B0604020202020204" pitchFamily="34" charset="0"/>
+              <a:buChar char="•"/>
+            </a:pPr>
+            <a:r>
+              <a:rPr lang="es-ES" dirty="0">
+                <a:solidFill>
+                  <a:schemeClr val="bg1"/>
+                </a:solidFill>
+                <a:latin typeface="Arial" panose="020B0604020202020204" pitchFamily="34" charset="0"/>
+                <a:cs typeface="Arial" panose="020B0604020202020204" pitchFamily="34" charset="0"/>
+              </a:rPr>
+              <a:t>Alcance del proyecto</a:t>
+            </a:r>
+          </a:p>
+          <a:p>
+            <a:pPr marL="285750" indent="-285750">
+              <a:buFont typeface="Arial" panose="020B0604020202020204" pitchFamily="34" charset="0"/>
+              <a:buChar char="•"/>
+            </a:pPr>
+            <a:r>
+              <a:rPr lang="es-ES" dirty="0">
+                <a:solidFill>
+                  <a:schemeClr val="bg1"/>
+                </a:solidFill>
+                <a:latin typeface="Arial" panose="020B0604020202020204" pitchFamily="34" charset="0"/>
+                <a:cs typeface="Arial" panose="020B0604020202020204" pitchFamily="34" charset="0"/>
+              </a:rPr>
+              <a:t>Justificación</a:t>
+            </a:r>
+          </a:p>
+          <a:p>
+            <a:r>
+              <a:rPr lang="es-ES" b="1" dirty="0">
+                <a:solidFill>
+                  <a:schemeClr val="bg1"/>
+                </a:solidFill>
+                <a:latin typeface="Arial" panose="020B0604020202020204" pitchFamily="34" charset="0"/>
+                <a:cs typeface="Arial" panose="020B0604020202020204" pitchFamily="34" charset="0"/>
+              </a:rPr>
+              <a:t>3)Levantamiento de información y tabulación de datos</a:t>
+            </a:r>
+          </a:p>
+          <a:p>
+            <a:r>
+              <a:rPr lang="es-ES" b="1" dirty="0">
+                <a:solidFill>
+                  <a:schemeClr val="bg1"/>
+                </a:solidFill>
+                <a:latin typeface="Arial" panose="020B0604020202020204" pitchFamily="34" charset="0"/>
+                <a:cs typeface="Arial" panose="020B0604020202020204" pitchFamily="34" charset="0"/>
+              </a:rPr>
+              <a:t> </a:t>
+            </a:r>
+          </a:p>
+          <a:p>
+            <a:r>
+              <a:rPr lang="es-ES" b="1" dirty="0">
+                <a:solidFill>
+                  <a:schemeClr val="bg1"/>
+                </a:solidFill>
+                <a:latin typeface="Arial" panose="020B0604020202020204" pitchFamily="34" charset="0"/>
+                <a:cs typeface="Arial" panose="020B0604020202020204" pitchFamily="34" charset="0"/>
+              </a:rPr>
+              <a:t>4)Mapa de procesos y diagramas de flujo</a:t>
+            </a:r>
+          </a:p>
+          <a:p>
+            <a:pPr marL="285750" indent="-285750">
+              <a:buFont typeface="Arial" panose="020B0604020202020204" pitchFamily="34" charset="0"/>
+              <a:buChar char="•"/>
+            </a:pPr>
+            <a:r>
+              <a:rPr lang="es-ES" dirty="0">
+                <a:solidFill>
+                  <a:schemeClr val="bg1"/>
+                </a:solidFill>
+                <a:latin typeface="Arial" panose="020B0604020202020204" pitchFamily="34" charset="0"/>
+                <a:cs typeface="Arial" panose="020B0604020202020204" pitchFamily="34" charset="0"/>
+              </a:rPr>
+              <a:t>Diagrama de flujo de necesidad del cliente</a:t>
+            </a:r>
+          </a:p>
+          <a:p>
+            <a:pPr marL="285750" indent="-285750">
+              <a:buFont typeface="Arial" panose="020B0604020202020204" pitchFamily="34" charset="0"/>
+              <a:buChar char="•"/>
+            </a:pPr>
+            <a:r>
+              <a:rPr lang="es-ES" dirty="0">
+                <a:solidFill>
+                  <a:schemeClr val="bg1"/>
+                </a:solidFill>
+                <a:latin typeface="Arial" panose="020B0604020202020204" pitchFamily="34" charset="0"/>
+                <a:cs typeface="Arial" panose="020B0604020202020204" pitchFamily="34" charset="0"/>
+              </a:rPr>
+              <a:t>Diagrama de flujo de gestión de ingreso</a:t>
+            </a:r>
+          </a:p>
+          <a:p>
+            <a:r>
+              <a:rPr lang="es-ES" b="1" dirty="0">
+                <a:solidFill>
+                  <a:schemeClr val="bg1"/>
+                </a:solidFill>
+                <a:latin typeface="Arial" panose="020B0604020202020204" pitchFamily="34" charset="0"/>
+                <a:cs typeface="Arial" panose="020B0604020202020204" pitchFamily="34" charset="0"/>
+              </a:rPr>
+              <a:t>5) Control de versiones(GITHUB)</a:t>
+            </a:r>
+          </a:p>
+          <a:p>
+            <a:endParaRPr lang="es-ES" b="1" dirty="0">
+              <a:solidFill>
+                <a:schemeClr val="bg1"/>
+              </a:solidFill>
+              <a:latin typeface="Arial" panose="020B0604020202020204" pitchFamily="34" charset="0"/>
+              <a:cs typeface="Arial" panose="020B0604020202020204" pitchFamily="34" charset="0"/>
+            </a:endParaRPr>
+          </a:p>
+          <a:p>
+            <a:r>
+              <a:rPr lang="es-ES" b="1" dirty="0">
+                <a:solidFill>
+                  <a:schemeClr val="bg1"/>
+                </a:solidFill>
+                <a:latin typeface="Arial" panose="020B0604020202020204" pitchFamily="34" charset="0"/>
+                <a:cs typeface="Arial" panose="020B0604020202020204" pitchFamily="34" charset="0"/>
+              </a:rPr>
+              <a:t>6)Documento IEEE 830</a:t>
+            </a:r>
+          </a:p>
+          <a:p>
+            <a:pPr marL="285750" indent="-285750">
+              <a:buFont typeface="Arial" panose="020B0604020202020204" pitchFamily="34" charset="0"/>
+              <a:buChar char="•"/>
+            </a:pPr>
+            <a:r>
+              <a:rPr lang="es-ES" dirty="0">
+                <a:solidFill>
+                  <a:schemeClr val="bg1"/>
+                </a:solidFill>
+                <a:latin typeface="Arial" panose="020B0604020202020204" pitchFamily="34" charset="0"/>
+                <a:cs typeface="Arial" panose="020B0604020202020204" pitchFamily="34" charset="0"/>
+              </a:rPr>
+              <a:t>Requerimientos funcionales</a:t>
+            </a:r>
+          </a:p>
+          <a:p>
+            <a:pPr marL="285750" indent="-285750">
+              <a:buFont typeface="Arial" panose="020B0604020202020204" pitchFamily="34" charset="0"/>
+              <a:buChar char="•"/>
+            </a:pPr>
+            <a:r>
+              <a:rPr lang="es-ES" dirty="0">
+                <a:solidFill>
+                  <a:schemeClr val="bg1"/>
+                </a:solidFill>
+                <a:latin typeface="Arial" panose="020B0604020202020204" pitchFamily="34" charset="0"/>
+                <a:cs typeface="Arial" panose="020B0604020202020204" pitchFamily="34" charset="0"/>
+              </a:rPr>
+              <a:t>Requerimientos no funcionales</a:t>
+            </a:r>
+          </a:p>
+          <a:p>
+            <a:r>
+              <a:rPr lang="es-ES" b="1" dirty="0">
+                <a:solidFill>
+                  <a:schemeClr val="bg1"/>
+                </a:solidFill>
+                <a:latin typeface="Arial" panose="020B0604020202020204" pitchFamily="34" charset="0"/>
+                <a:cs typeface="Arial" panose="020B0604020202020204" pitchFamily="34" charset="0"/>
+              </a:rPr>
+              <a:t>7)Diagramas casos de uso</a:t>
+            </a:r>
+          </a:p>
+          <a:p>
+            <a:pPr marL="285750" indent="-285750">
+              <a:buFont typeface="Arial" panose="020B0604020202020204" pitchFamily="34" charset="0"/>
+              <a:buChar char="•"/>
+            </a:pPr>
+            <a:r>
+              <a:rPr lang="es-ES" dirty="0">
+                <a:solidFill>
+                  <a:schemeClr val="bg1"/>
+                </a:solidFill>
+                <a:latin typeface="Arial" panose="020B0604020202020204" pitchFamily="34" charset="0"/>
+                <a:cs typeface="Arial" panose="020B0604020202020204" pitchFamily="34" charset="0"/>
+              </a:rPr>
+              <a:t>Casos de uso extendido</a:t>
+            </a:r>
+          </a:p>
+          <a:p>
+            <a:pPr marL="285750" indent="-285750">
+              <a:buFont typeface="Arial" panose="020B0604020202020204" pitchFamily="34" charset="0"/>
+              <a:buChar char="•"/>
+            </a:pPr>
+            <a:r>
+              <a:rPr lang="es-ES" dirty="0">
+                <a:solidFill>
+                  <a:schemeClr val="bg1"/>
+                </a:solidFill>
+                <a:latin typeface="Arial" panose="020B0604020202020204" pitchFamily="34" charset="0"/>
+                <a:cs typeface="Arial" panose="020B0604020202020204" pitchFamily="34" charset="0"/>
+              </a:rPr>
+              <a:t>Formato de documentación</a:t>
+            </a:r>
           </a:p>
         </p:txBody>
       </p:sp>
@@ -5649,6 +6503,91 @@
           <a:chExt cx="0" cy="0"/>
         </a:xfrm>
       </p:grpSpPr>
+      <p:sp>
+        <p:nvSpPr>
+          <p:cNvPr id="3" name="CuadroTexto 2">
+            <a:extLst>
+              <a:ext uri="{FF2B5EF4-FFF2-40B4-BE49-F238E27FC236}">
+                <a16:creationId xmlns:a16="http://schemas.microsoft.com/office/drawing/2014/main" id="{9DB85218-CD41-41C5-8F5E-C811590A3A0A}"/>
+              </a:ext>
+            </a:extLst>
+          </p:cNvPr>
+          <p:cNvSpPr txBox="1"/>
+          <p:nvPr/>
+        </p:nvSpPr>
+        <p:spPr>
+          <a:xfrm>
+            <a:off x="2241452" y="372795"/>
+            <a:ext cx="7709095" cy="1569660"/>
+          </a:xfrm>
+          <a:prstGeom prst="rect">
+            <a:avLst/>
+          </a:prstGeom>
+          <a:noFill/>
+        </p:spPr>
+        <p:txBody>
+          <a:bodyPr wrap="square" rtlCol="0">
+            <a:spAutoFit/>
+          </a:bodyPr>
+          <a:lstStyle/>
+          <a:p>
+            <a:pPr algn="ctr"/>
+            <a:r>
+              <a:rPr lang="es-ES" sz="9600" b="1" dirty="0">
+                <a:solidFill>
+                  <a:srgbClr val="0070C0"/>
+                </a:solidFill>
+                <a:latin typeface="Arial" panose="020B0604020202020204" pitchFamily="34" charset="0"/>
+                <a:cs typeface="Arial" panose="020B0604020202020204" pitchFamily="34" charset="0"/>
+              </a:rPr>
+              <a:t>NEARBY</a:t>
+            </a:r>
+            <a:endParaRPr lang="es-CO" sz="9600" b="1" dirty="0">
+              <a:solidFill>
+                <a:srgbClr val="0070C0"/>
+              </a:solidFill>
+              <a:latin typeface="Arial" panose="020B0604020202020204" pitchFamily="34" charset="0"/>
+              <a:cs typeface="Arial" panose="020B0604020202020204" pitchFamily="34" charset="0"/>
+            </a:endParaRPr>
+          </a:p>
+        </p:txBody>
+      </p:sp>
+      <p:pic>
+        <p:nvPicPr>
+          <p:cNvPr id="5" name="Imagen 4">
+            <a:extLst>
+              <a:ext uri="{FF2B5EF4-FFF2-40B4-BE49-F238E27FC236}">
+                <a16:creationId xmlns:a16="http://schemas.microsoft.com/office/drawing/2014/main" id="{74E1FAC5-9FED-46DA-A649-00383D12FEE1}"/>
+              </a:ext>
+            </a:extLst>
+          </p:cNvPr>
+          <p:cNvPicPr>
+            <a:picLocks noChangeAspect="1"/>
+          </p:cNvPicPr>
+          <p:nvPr/>
+        </p:nvPicPr>
+        <p:blipFill>
+          <a:blip r:embed="rId3">
+            <a:extLst>
+              <a:ext uri="{28A0092B-C50C-407E-A947-70E740481C1C}">
+                <a14:useLocalDpi xmlns:a14="http://schemas.microsoft.com/office/drawing/2010/main" val="0"/>
+              </a:ext>
+            </a:extLst>
+          </a:blip>
+          <a:stretch>
+            <a:fillRect/>
+          </a:stretch>
+        </p:blipFill>
+        <p:spPr>
+          <a:xfrm>
+            <a:off x="4492282" y="2277270"/>
+            <a:ext cx="3207434" cy="4207935"/>
+          </a:xfrm>
+          <a:prstGeom prst="rect">
+            <a:avLst/>
+          </a:prstGeom>
+        </p:spPr>
+      </p:pic>
     </p:spTree>
   </p:cSld>
   <p:clrMapOvr>
@@ -5674,6 +6613,203 @@
           <a:chExt cx="0" cy="0"/>
         </a:xfrm>
       </p:grpSpPr>
+      <p:sp>
+        <p:nvSpPr>
+          <p:cNvPr id="2" name="CuadroTexto 1">
+            <a:extLst>
+              <a:ext uri="{FF2B5EF4-FFF2-40B4-BE49-F238E27FC236}">
+                <a16:creationId xmlns:a16="http://schemas.microsoft.com/office/drawing/2014/main" id="{BC758410-DEA8-4A1F-AF32-CF4DA320955F}"/>
+              </a:ext>
+            </a:extLst>
+          </p:cNvPr>
+          <p:cNvSpPr txBox="1"/>
+          <p:nvPr/>
+        </p:nvSpPr>
+        <p:spPr>
+          <a:xfrm>
+            <a:off x="2065606" y="578560"/>
+            <a:ext cx="6879102" cy="523220"/>
+          </a:xfrm>
+          <a:prstGeom prst="rect">
+            <a:avLst/>
+          </a:prstGeom>
+          <a:noFill/>
+        </p:spPr>
+        <p:txBody>
+          <a:bodyPr wrap="square" rtlCol="0">
+            <a:spAutoFit/>
+          </a:bodyPr>
+          <a:lstStyle/>
+          <a:p>
+            <a:pPr algn="ctr"/>
+            <a:r>
+              <a:rPr lang="es-ES" sz="2800" b="1">
+                <a:solidFill>
+                  <a:srgbClr val="0070C0"/>
+                </a:solidFill>
+                <a:latin typeface="Arial" panose="020B0604020202020204" pitchFamily="34" charset="0"/>
+                <a:cs typeface="Arial" panose="020B0604020202020204" pitchFamily="34" charset="0"/>
+              </a:rPr>
+              <a:t>PLANTEAMIENTO DEL PROBLEMA</a:t>
+            </a:r>
+            <a:endParaRPr lang="es-CO" sz="2800" b="1" dirty="0">
+              <a:solidFill>
+                <a:srgbClr val="0070C0"/>
+              </a:solidFill>
+              <a:latin typeface="Arial" panose="020B0604020202020204" pitchFamily="34" charset="0"/>
+              <a:cs typeface="Arial" panose="020B0604020202020204" pitchFamily="34" charset="0"/>
+            </a:endParaRPr>
+          </a:p>
+        </p:txBody>
+      </p:sp>
+      <p:sp>
+        <p:nvSpPr>
+          <p:cNvPr id="5" name="CuadroTexto 4">
+            <a:extLst>
+              <a:ext uri="{FF2B5EF4-FFF2-40B4-BE49-F238E27FC236}">
+                <a16:creationId xmlns:a16="http://schemas.microsoft.com/office/drawing/2014/main" id="{03EC8784-F841-4BD9-8443-3B6F41DC20A4}"/>
+              </a:ext>
+            </a:extLst>
+          </p:cNvPr>
+          <p:cNvSpPr txBox="1"/>
+          <p:nvPr/>
+        </p:nvSpPr>
+        <p:spPr>
+          <a:xfrm>
+            <a:off x="422031" y="1350498"/>
+            <a:ext cx="9791114" cy="4801314"/>
+          </a:xfrm>
+          <a:prstGeom prst="rect">
+            <a:avLst/>
+          </a:prstGeom>
+          <a:noFill/>
+        </p:spPr>
+        <p:txBody>
+          <a:bodyPr wrap="square" rtlCol="0">
+            <a:spAutoFit/>
+          </a:bodyPr>
+          <a:lstStyle/>
+          <a:p>
+            <a:pPr algn="just"/>
+            <a:r>
+              <a:rPr lang="es-ES" dirty="0">
+                <a:solidFill>
+                  <a:srgbClr val="0070C0"/>
+                </a:solidFill>
+                <a:latin typeface="Arial" panose="020B0604020202020204" pitchFamily="34" charset="0"/>
+                <a:cs typeface="Arial" panose="020B0604020202020204" pitchFamily="34" charset="0"/>
+              </a:rPr>
+              <a:t>Se determinó que la mayoría de conductores que se desplazan en diferentes vehículos (bicicleta, moto y carro) alrededor de la ciudad, presentaban la necesidad de encontrar eficientemente un estacionamiento(parqueadero) para dejar su vehículo, teniendo la tranquilidad de que este será supervisado por dicho establecimiento hasta que el conductor regrese, pero las aplicaciones comunes como lo son; </a:t>
+            </a:r>
+            <a:r>
+              <a:rPr lang="es-ES" dirty="0" err="1">
+                <a:solidFill>
+                  <a:srgbClr val="0070C0"/>
+                </a:solidFill>
+                <a:latin typeface="Arial" panose="020B0604020202020204" pitchFamily="34" charset="0"/>
+                <a:cs typeface="Arial" panose="020B0604020202020204" pitchFamily="34" charset="0"/>
+              </a:rPr>
+              <a:t>Waze</a:t>
+            </a:r>
+            <a:r>
+              <a:rPr lang="es-ES" dirty="0">
+                <a:solidFill>
+                  <a:srgbClr val="0070C0"/>
+                </a:solidFill>
+                <a:latin typeface="Arial" panose="020B0604020202020204" pitchFamily="34" charset="0"/>
+                <a:cs typeface="Arial" panose="020B0604020202020204" pitchFamily="34" charset="0"/>
+              </a:rPr>
+              <a:t> o Google </a:t>
+            </a:r>
+            <a:r>
+              <a:rPr lang="es-ES" dirty="0" err="1">
+                <a:solidFill>
+                  <a:srgbClr val="0070C0"/>
+                </a:solidFill>
+                <a:latin typeface="Arial" panose="020B0604020202020204" pitchFamily="34" charset="0"/>
+                <a:cs typeface="Arial" panose="020B0604020202020204" pitchFamily="34" charset="0"/>
+              </a:rPr>
+              <a:t>Maps</a:t>
+            </a:r>
+            <a:r>
+              <a:rPr lang="es-ES" dirty="0">
+                <a:solidFill>
+                  <a:srgbClr val="0070C0"/>
+                </a:solidFill>
+                <a:latin typeface="Arial" panose="020B0604020202020204" pitchFamily="34" charset="0"/>
+                <a:cs typeface="Arial" panose="020B0604020202020204" pitchFamily="34" charset="0"/>
+              </a:rPr>
+              <a:t> no son del todo asertivas con la información que muestran respecto a este tipo de establecimientos, ya sea por falta de información o por negocios no registrados dentro la base de datos, es casi imposible determinar cuál es el mejor establecimiento para poder dejar el vehículo.</a:t>
+            </a:r>
+          </a:p>
+          <a:p>
+            <a:pPr algn="just"/>
+            <a:r>
+              <a:rPr lang="es-ES" dirty="0">
+                <a:solidFill>
+                  <a:srgbClr val="0070C0"/>
+                </a:solidFill>
+                <a:latin typeface="Arial" panose="020B0604020202020204" pitchFamily="34" charset="0"/>
+                <a:cs typeface="Arial" panose="020B0604020202020204" pitchFamily="34" charset="0"/>
+              </a:rPr>
+              <a:t>La publicidad y el marketing son vitales a la hora de promocionar un producto o un negocio, en este caso un estacionamiento, se observa que los parqueaderos no se cuentan con publicidad en sitios web haciendo más difícil encontrarlos y acceder a ellos. Se pueden presentar casos en los que un parqueadero brinda un muy buen servicio, pero no se muestran como la mejor opción a la hora de su búsqueda.</a:t>
+            </a:r>
+          </a:p>
+          <a:p>
+            <a:pPr algn="just"/>
+            <a:r>
+              <a:rPr lang="es-ES" dirty="0">
+                <a:solidFill>
+                  <a:srgbClr val="0070C0"/>
+                </a:solidFill>
+                <a:latin typeface="Arial" panose="020B0604020202020204" pitchFamily="34" charset="0"/>
+                <a:cs typeface="Arial" panose="020B0604020202020204" pitchFamily="34" charset="0"/>
+              </a:rPr>
+              <a:t>Se determinó que distintas aplicaciones como </a:t>
+            </a:r>
+            <a:r>
+              <a:rPr lang="es-ES" dirty="0" err="1">
+                <a:solidFill>
+                  <a:srgbClr val="0070C0"/>
+                </a:solidFill>
+                <a:latin typeface="Arial" panose="020B0604020202020204" pitchFamily="34" charset="0"/>
+                <a:cs typeface="Arial" panose="020B0604020202020204" pitchFamily="34" charset="0"/>
+              </a:rPr>
+              <a:t>Waze</a:t>
+            </a:r>
+            <a:r>
+              <a:rPr lang="es-ES" dirty="0">
+                <a:solidFill>
+                  <a:srgbClr val="0070C0"/>
+                </a:solidFill>
+                <a:latin typeface="Arial" panose="020B0604020202020204" pitchFamily="34" charset="0"/>
+                <a:cs typeface="Arial" panose="020B0604020202020204" pitchFamily="34" charset="0"/>
+              </a:rPr>
+              <a:t> y Google </a:t>
+            </a:r>
+            <a:r>
+              <a:rPr lang="es-ES" dirty="0" err="1">
+                <a:solidFill>
+                  <a:srgbClr val="0070C0"/>
+                </a:solidFill>
+                <a:latin typeface="Arial" panose="020B0604020202020204" pitchFamily="34" charset="0"/>
+                <a:cs typeface="Arial" panose="020B0604020202020204" pitchFamily="34" charset="0"/>
+              </a:rPr>
+              <a:t>Maps</a:t>
+            </a:r>
+            <a:r>
+              <a:rPr lang="es-ES" dirty="0">
+                <a:solidFill>
+                  <a:srgbClr val="0070C0"/>
+                </a:solidFill>
+                <a:latin typeface="Arial" panose="020B0604020202020204" pitchFamily="34" charset="0"/>
+                <a:cs typeface="Arial" panose="020B0604020202020204" pitchFamily="34" charset="0"/>
+              </a:rPr>
+              <a:t> no presentan de forma asertiva los cupos disponibles dentro del parqueadero, algún tipo de calificación y/o opiniones de los usuarios podrían hacerle más difícil al cliente determinar el lugar o establecimiento al que desee ir.</a:t>
+            </a:r>
+          </a:p>
+        </p:txBody>
+      </p:sp>
     </p:spTree>
   </p:cSld>
   <p:clrMapOvr>
@@ -5683,6 +6819,357 @@
 </file>
 
 <file path=ppt/slides/slide6.xml><?xml version="1.0" encoding="utf-8"?>
+<p:sld xmlns:a="http://schemas.openxmlformats.org/drawingml/2006/main" xmlns:r="http://schemas.openxmlformats.org/officeDocument/2006/relationships" xmlns:p="http://schemas.openxmlformats.org/presentationml/2006/main">
+  <p:cSld>
+    <p:spTree>
+      <p:nvGrpSpPr>
+        <p:cNvPr id="1" name="Shape 125"/>
+        <p:cNvGrpSpPr/>
+        <p:nvPr/>
+      </p:nvGrpSpPr>
+      <p:grpSpPr>
+        <a:xfrm>
+          <a:off x="0" y="0"/>
+          <a:ext cx="0" cy="0"/>
+          <a:chOff x="0" y="0"/>
+          <a:chExt cx="0" cy="0"/>
+        </a:xfrm>
+      </p:grpSpPr>
+      <p:sp>
+        <p:nvSpPr>
+          <p:cNvPr id="3" name="CuadroTexto 2">
+            <a:extLst>
+              <a:ext uri="{FF2B5EF4-FFF2-40B4-BE49-F238E27FC236}">
+                <a16:creationId xmlns:a16="http://schemas.microsoft.com/office/drawing/2014/main" id="{BFA7DC27-543D-421A-8BB2-95A8CFB88473}"/>
+              </a:ext>
+            </a:extLst>
+          </p:cNvPr>
+          <p:cNvSpPr txBox="1"/>
+          <p:nvPr/>
+        </p:nvSpPr>
+        <p:spPr>
+          <a:xfrm>
+            <a:off x="2206283" y="494154"/>
+            <a:ext cx="6879102" cy="523220"/>
+          </a:xfrm>
+          <a:prstGeom prst="rect">
+            <a:avLst/>
+          </a:prstGeom>
+          <a:noFill/>
+        </p:spPr>
+        <p:txBody>
+          <a:bodyPr wrap="square" rtlCol="0">
+            <a:spAutoFit/>
+          </a:bodyPr>
+          <a:lstStyle/>
+          <a:p>
+            <a:pPr algn="ctr"/>
+            <a:r>
+              <a:rPr lang="es-ES" sz="2800" b="1" dirty="0">
+                <a:solidFill>
+                  <a:srgbClr val="0070C0"/>
+                </a:solidFill>
+                <a:latin typeface="Arial" panose="020B0604020202020204" pitchFamily="34" charset="0"/>
+                <a:cs typeface="Arial" panose="020B0604020202020204" pitchFamily="34" charset="0"/>
+              </a:rPr>
+              <a:t>OBJETIVO GENERAL</a:t>
+            </a:r>
+            <a:endParaRPr lang="es-CO" sz="2800" b="1" dirty="0">
+              <a:solidFill>
+                <a:srgbClr val="0070C0"/>
+              </a:solidFill>
+              <a:latin typeface="Arial" panose="020B0604020202020204" pitchFamily="34" charset="0"/>
+              <a:cs typeface="Arial" panose="020B0604020202020204" pitchFamily="34" charset="0"/>
+            </a:endParaRPr>
+          </a:p>
+        </p:txBody>
+      </p:sp>
+      <p:sp>
+        <p:nvSpPr>
+          <p:cNvPr id="4" name="CuadroTexto 3">
+            <a:extLst>
+              <a:ext uri="{FF2B5EF4-FFF2-40B4-BE49-F238E27FC236}">
+                <a16:creationId xmlns:a16="http://schemas.microsoft.com/office/drawing/2014/main" id="{AE549AC0-6878-4F5E-8330-50966286A2A8}"/>
+              </a:ext>
+            </a:extLst>
+          </p:cNvPr>
+          <p:cNvSpPr txBox="1"/>
+          <p:nvPr/>
+        </p:nvSpPr>
+        <p:spPr>
+          <a:xfrm>
+            <a:off x="422032" y="1434905"/>
+            <a:ext cx="9439422" cy="1477328"/>
+          </a:xfrm>
+          <a:prstGeom prst="rect">
+            <a:avLst/>
+          </a:prstGeom>
+          <a:noFill/>
+        </p:spPr>
+        <p:txBody>
+          <a:bodyPr wrap="square" rtlCol="0">
+            <a:spAutoFit/>
+          </a:bodyPr>
+          <a:lstStyle/>
+          <a:p>
+            <a:pPr algn="just"/>
+            <a:r>
+              <a:rPr lang="es-ES" dirty="0">
+                <a:solidFill>
+                  <a:srgbClr val="0070C0"/>
+                </a:solidFill>
+                <a:latin typeface="Arial" panose="020B0604020202020204" pitchFamily="34" charset="0"/>
+                <a:cs typeface="Arial" panose="020B0604020202020204" pitchFamily="34" charset="0"/>
+              </a:rPr>
+              <a:t>Desarrollar una aplicación la cual gestione la información de parqueaderos, permitiendo mayor seguridad a los usuarios y agilidad al momento de realizar una búsqueda en una zona en específico, para encontrar parqueaderos con espacios disponibles, además permitirá a los estacionamientos administrar el ingreso de vehículos para mostrar en todo momento cuantos espacios tiene disponibles el establecimiento.</a:t>
+            </a:r>
+            <a:endParaRPr lang="es-CO" dirty="0">
+              <a:solidFill>
+                <a:srgbClr val="0070C0"/>
+              </a:solidFill>
+              <a:latin typeface="Arial" panose="020B0604020202020204" pitchFamily="34" charset="0"/>
+              <a:cs typeface="Arial" panose="020B0604020202020204" pitchFamily="34" charset="0"/>
+            </a:endParaRPr>
+          </a:p>
+        </p:txBody>
+      </p:sp>
+    </p:spTree>
+    <p:extLst>
+      <p:ext uri="{BB962C8B-B14F-4D97-AF65-F5344CB8AC3E}">
+        <p14:creationId xmlns:p14="http://schemas.microsoft.com/office/powerpoint/2010/main" val="2252580914"/>
+      </p:ext>
+    </p:extLst>
+  </p:cSld>
+  <p:clrMapOvr>
+    <a:masterClrMapping/>
+  </p:clrMapOvr>
+</p:sld>
+</file>
+
+<file path=ppt/slides/slide7.xml><?xml version="1.0" encoding="utf-8"?>
+<p:sld xmlns:a="http://schemas.openxmlformats.org/drawingml/2006/main" xmlns:r="http://schemas.openxmlformats.org/officeDocument/2006/relationships" xmlns:p="http://schemas.openxmlformats.org/presentationml/2006/main">
+  <p:cSld>
+    <p:spTree>
+      <p:nvGrpSpPr>
+        <p:cNvPr id="1" name=""/>
+        <p:cNvGrpSpPr/>
+        <p:nvPr/>
+      </p:nvGrpSpPr>
+      <p:grpSpPr>
+        <a:xfrm>
+          <a:off x="0" y="0"/>
+          <a:ext cx="0" cy="0"/>
+          <a:chOff x="0" y="0"/>
+          <a:chExt cx="0" cy="0"/>
+        </a:xfrm>
+      </p:grpSpPr>
+      <p:sp>
+        <p:nvSpPr>
+          <p:cNvPr id="4" name="CuadroTexto 3">
+            <a:extLst>
+              <a:ext uri="{FF2B5EF4-FFF2-40B4-BE49-F238E27FC236}">
+                <a16:creationId xmlns:a16="http://schemas.microsoft.com/office/drawing/2014/main" id="{A8F5DA41-2BB2-4B3B-9F0C-47F2FE05DA23}"/>
+              </a:ext>
+            </a:extLst>
+          </p:cNvPr>
+          <p:cNvSpPr txBox="1"/>
+          <p:nvPr/>
+        </p:nvSpPr>
+        <p:spPr>
+          <a:xfrm>
+            <a:off x="2025747" y="492370"/>
+            <a:ext cx="7244861" cy="584775"/>
+          </a:xfrm>
+          <a:prstGeom prst="rect">
+            <a:avLst/>
+          </a:prstGeom>
+          <a:noFill/>
+        </p:spPr>
+        <p:txBody>
+          <a:bodyPr wrap="square" rtlCol="0">
+            <a:spAutoFit/>
+          </a:bodyPr>
+          <a:lstStyle/>
+          <a:p>
+            <a:pPr algn="ctr"/>
+            <a:r>
+              <a:rPr lang="es-ES" sz="3200" b="1" dirty="0">
+                <a:solidFill>
+                  <a:srgbClr val="0070C0"/>
+                </a:solidFill>
+                <a:latin typeface="Arial" panose="020B0604020202020204" pitchFamily="34" charset="0"/>
+                <a:cs typeface="Arial" panose="020B0604020202020204" pitchFamily="34" charset="0"/>
+              </a:rPr>
+              <a:t>OBJETIVOS ESPECIFICOS</a:t>
+            </a:r>
+            <a:endParaRPr lang="es-CO" sz="3200" b="1" dirty="0">
+              <a:solidFill>
+                <a:srgbClr val="0070C0"/>
+              </a:solidFill>
+              <a:latin typeface="Arial" panose="020B0604020202020204" pitchFamily="34" charset="0"/>
+              <a:cs typeface="Arial" panose="020B0604020202020204" pitchFamily="34" charset="0"/>
+            </a:endParaRPr>
+          </a:p>
+        </p:txBody>
+      </p:sp>
+      <p:sp>
+        <p:nvSpPr>
+          <p:cNvPr id="6" name="CuadroTexto 5">
+            <a:extLst>
+              <a:ext uri="{FF2B5EF4-FFF2-40B4-BE49-F238E27FC236}">
+                <a16:creationId xmlns:a16="http://schemas.microsoft.com/office/drawing/2014/main" id="{30CCC4ED-43A0-4D60-9B10-7DABDB29B07F}"/>
+              </a:ext>
+            </a:extLst>
+          </p:cNvPr>
+          <p:cNvSpPr txBox="1"/>
+          <p:nvPr/>
+        </p:nvSpPr>
+        <p:spPr>
+          <a:xfrm>
+            <a:off x="281354" y="2236763"/>
+            <a:ext cx="10156874" cy="1754326"/>
+          </a:xfrm>
+          <a:prstGeom prst="rect">
+            <a:avLst/>
+          </a:prstGeom>
+          <a:noFill/>
+        </p:spPr>
+        <p:txBody>
+          <a:bodyPr wrap="square" rtlCol="0">
+            <a:spAutoFit/>
+          </a:bodyPr>
+          <a:lstStyle/>
+          <a:p>
+            <a:pPr algn="just"/>
+            <a:r>
+              <a:rPr lang="es-ES" dirty="0">
+                <a:solidFill>
+                  <a:srgbClr val="0070C0"/>
+                </a:solidFill>
+                <a:latin typeface="Arial" panose="020B0604020202020204" pitchFamily="34" charset="0"/>
+                <a:cs typeface="Arial" panose="020B0604020202020204" pitchFamily="34" charset="0"/>
+              </a:rPr>
+              <a:t>•	Se deberá realizar la investigación pertinente para establecer requerimientos </a:t>
+            </a:r>
+          </a:p>
+          <a:p>
+            <a:pPr algn="just"/>
+            <a:r>
+              <a:rPr lang="es-ES" dirty="0">
+                <a:solidFill>
+                  <a:srgbClr val="0070C0"/>
+                </a:solidFill>
+                <a:latin typeface="Arial" panose="020B0604020202020204" pitchFamily="34" charset="0"/>
+                <a:cs typeface="Arial" panose="020B0604020202020204" pitchFamily="34" charset="0"/>
+              </a:rPr>
+              <a:t>•	Se tendrá que determinar su principal función</a:t>
+            </a:r>
+          </a:p>
+          <a:p>
+            <a:pPr algn="just"/>
+            <a:r>
+              <a:rPr lang="es-ES" dirty="0">
+                <a:solidFill>
+                  <a:srgbClr val="0070C0"/>
+                </a:solidFill>
+                <a:latin typeface="Arial" panose="020B0604020202020204" pitchFamily="34" charset="0"/>
+                <a:cs typeface="Arial" panose="020B0604020202020204" pitchFamily="34" charset="0"/>
+              </a:rPr>
+              <a:t>•	Se deberá hacer un análisis previo al desarrollo para facilitar el proceso de programación</a:t>
+            </a:r>
+          </a:p>
+          <a:p>
+            <a:pPr algn="just"/>
+            <a:r>
+              <a:rPr lang="es-ES" dirty="0">
+                <a:solidFill>
+                  <a:srgbClr val="0070C0"/>
+                </a:solidFill>
+                <a:latin typeface="Arial" panose="020B0604020202020204" pitchFamily="34" charset="0"/>
+                <a:cs typeface="Arial" panose="020B0604020202020204" pitchFamily="34" charset="0"/>
+              </a:rPr>
+              <a:t>•	Programar el aplicativo en java para permitir el multiplataformas</a:t>
+            </a:r>
+          </a:p>
+          <a:p>
+            <a:pPr algn="just"/>
+            <a:r>
+              <a:rPr lang="es-ES" dirty="0">
+                <a:solidFill>
+                  <a:srgbClr val="0070C0"/>
+                </a:solidFill>
+                <a:latin typeface="Arial" panose="020B0604020202020204" pitchFamily="34" charset="0"/>
+                <a:cs typeface="Arial" panose="020B0604020202020204" pitchFamily="34" charset="0"/>
+              </a:rPr>
+              <a:t>•	Establecer publico al cual va dirigida la app</a:t>
+            </a:r>
+          </a:p>
+          <a:p>
+            <a:pPr algn="just"/>
+            <a:r>
+              <a:rPr lang="es-ES" dirty="0">
+                <a:solidFill>
+                  <a:srgbClr val="0070C0"/>
+                </a:solidFill>
+                <a:latin typeface="Arial" panose="020B0604020202020204" pitchFamily="34" charset="0"/>
+                <a:cs typeface="Arial" panose="020B0604020202020204" pitchFamily="34" charset="0"/>
+              </a:rPr>
+              <a:t>•	Promocionar y vender la idea a diferentes empresas para implementarla </a:t>
+            </a:r>
+            <a:endParaRPr lang="es-CO" dirty="0">
+              <a:solidFill>
+                <a:srgbClr val="0070C0"/>
+              </a:solidFill>
+              <a:latin typeface="Arial" panose="020B0604020202020204" pitchFamily="34" charset="0"/>
+              <a:cs typeface="Arial" panose="020B0604020202020204" pitchFamily="34" charset="0"/>
+            </a:endParaRPr>
+          </a:p>
+        </p:txBody>
+      </p:sp>
+    </p:spTree>
+    <p:extLst>
+      <p:ext uri="{BB962C8B-B14F-4D97-AF65-F5344CB8AC3E}">
+        <p14:creationId xmlns:p14="http://schemas.microsoft.com/office/powerpoint/2010/main" val="1372745584"/>
+      </p:ext>
+    </p:extLst>
+  </p:cSld>
+  <p:clrMapOvr>
+    <a:masterClrMapping/>
+  </p:clrMapOvr>
+</p:sld>
+</file>
+
+<file path=ppt/slides/slide8.xml><?xml version="1.0" encoding="utf-8"?>
+<p:sld xmlns:a="http://schemas.openxmlformats.org/drawingml/2006/main" xmlns:r="http://schemas.openxmlformats.org/officeDocument/2006/relationships" xmlns:p="http://schemas.openxmlformats.org/presentationml/2006/main">
+  <p:cSld>
+    <p:spTree>
+      <p:nvGrpSpPr>
+        <p:cNvPr id="1" name="Shape 87"/>
+        <p:cNvGrpSpPr/>
+        <p:nvPr/>
+      </p:nvGrpSpPr>
+      <p:grpSpPr>
+        <a:xfrm>
+          <a:off x="0" y="0"/>
+          <a:ext cx="0" cy="0"/>
+          <a:chOff x="0" y="0"/>
+          <a:chExt cx="0" cy="0"/>
+        </a:xfrm>
+      </p:grpSpPr>
+    </p:spTree>
+    <p:extLst>
+      <p:ext uri="{BB962C8B-B14F-4D97-AF65-F5344CB8AC3E}">
+        <p14:creationId xmlns:p14="http://schemas.microsoft.com/office/powerpoint/2010/main" val="2881915805"/>
+      </p:ext>
+    </p:extLst>
+  </p:cSld>
+  <p:clrMapOvr>
+    <a:masterClrMapping/>
+  </p:clrMapOvr>
+</p:sld>
+</file>
+
+<file path=ppt/slides/slide9.xml><?xml version="1.0" encoding="utf-8"?>
 <p:sld xmlns:a="http://schemas.openxmlformats.org/drawingml/2006/main" xmlns:r="http://schemas.openxmlformats.org/officeDocument/2006/relationships" xmlns:p="http://schemas.openxmlformats.org/presentationml/2006/main">
   <p:cSld>
     <p:spTree>

</xml_diff>

<commit_message>
Modificacion de plantilla 3
</commit_message>
<xml_diff>
--- a/PLANTILLA_PRESENTACION_AVANCES_PROYECTO_.pptx
+++ b/PLANTILLA_PRESENTACION_AVANCES_PROYECTO_.pptx
@@ -5,7 +5,7 @@
     <p:sldMasterId id="2147483648" r:id="rId1"/>
   </p:sldMasterIdLst>
   <p:notesMasterIdLst>
-    <p:notesMasterId r:id="rId14"/>
+    <p:notesMasterId r:id="rId18"/>
   </p:notesMasterIdLst>
   <p:sldIdLst>
     <p:sldId id="257" r:id="rId2"/>
@@ -19,7 +19,11 @@
     <p:sldId id="281" r:id="rId10"/>
     <p:sldId id="277" r:id="rId11"/>
     <p:sldId id="282" r:id="rId12"/>
-    <p:sldId id="273" r:id="rId13"/>
+    <p:sldId id="283" r:id="rId13"/>
+    <p:sldId id="285" r:id="rId14"/>
+    <p:sldId id="284" r:id="rId15"/>
+    <p:sldId id="286" r:id="rId16"/>
+    <p:sldId id="273" r:id="rId17"/>
   </p:sldIdLst>
   <p:sldSz cx="12192000" cy="6858000"/>
   <p:notesSz cx="6858000" cy="9144000"/>
@@ -1051,7 +1055,7 @@
             </a:pPr>
             <a:fld id="{00000000-1234-1234-1234-123412341234}" type="slidenum">
               <a:rPr lang="es-ES"/>
-              <a:t>12</a:t>
+              <a:t>16</a:t>
             </a:fld>
             <a:endParaRPr/>
           </a:p>
@@ -6733,6 +6737,317 @@
 </file>
 
 <file path=ppt/slides/slide12.xml><?xml version="1.0" encoding="utf-8"?>
+<p:sld xmlns:a="http://schemas.openxmlformats.org/drawingml/2006/main" xmlns:r="http://schemas.openxmlformats.org/officeDocument/2006/relationships" xmlns:p="http://schemas.openxmlformats.org/presentationml/2006/main">
+  <p:cSld>
+    <p:spTree>
+      <p:nvGrpSpPr>
+        <p:cNvPr id="1" name=""/>
+        <p:cNvGrpSpPr/>
+        <p:nvPr/>
+      </p:nvGrpSpPr>
+      <p:grpSpPr>
+        <a:xfrm>
+          <a:off x="0" y="0"/>
+          <a:ext cx="0" cy="0"/>
+          <a:chOff x="0" y="0"/>
+          <a:chExt cx="0" cy="0"/>
+        </a:xfrm>
+      </p:grpSpPr>
+      <p:pic>
+        <p:nvPicPr>
+          <p:cNvPr id="10" name="Imagen 9">
+            <a:extLst>
+              <a:ext uri="{FF2B5EF4-FFF2-40B4-BE49-F238E27FC236}">
+                <a16:creationId xmlns:a16="http://schemas.microsoft.com/office/drawing/2014/main" id="{0150299B-6367-4FD9-944E-D4BFA57733DD}"/>
+              </a:ext>
+            </a:extLst>
+          </p:cNvPr>
+          <p:cNvPicPr>
+            <a:picLocks noChangeAspect="1"/>
+          </p:cNvPicPr>
+          <p:nvPr/>
+        </p:nvPicPr>
+        <p:blipFill>
+          <a:blip r:embed="rId2">
+            <a:extLst>
+              <a:ext uri="{28A0092B-C50C-407E-A947-70E740481C1C}">
+                <a14:useLocalDpi xmlns:a14="http://schemas.microsoft.com/office/drawing/2010/main" val="0"/>
+              </a:ext>
+            </a:extLst>
+          </a:blip>
+          <a:stretch>
+            <a:fillRect/>
+          </a:stretch>
+        </p:blipFill>
+        <p:spPr>
+          <a:xfrm>
+            <a:off x="1740339" y="-11606"/>
+            <a:ext cx="8711322" cy="6881212"/>
+          </a:xfrm>
+          <a:prstGeom prst="rect">
+            <a:avLst/>
+          </a:prstGeom>
+        </p:spPr>
+      </p:pic>
+    </p:spTree>
+    <p:extLst>
+      <p:ext uri="{BB962C8B-B14F-4D97-AF65-F5344CB8AC3E}">
+        <p14:creationId xmlns:p14="http://schemas.microsoft.com/office/powerpoint/2010/main" val="3298172084"/>
+      </p:ext>
+    </p:extLst>
+  </p:cSld>
+  <p:clrMapOvr>
+    <a:masterClrMapping/>
+  </p:clrMapOvr>
+</p:sld>
+</file>
+
+<file path=ppt/slides/slide13.xml><?xml version="1.0" encoding="utf-8"?>
+<p:sld xmlns:a="http://schemas.openxmlformats.org/drawingml/2006/main" xmlns:r="http://schemas.openxmlformats.org/officeDocument/2006/relationships" xmlns:p="http://schemas.openxmlformats.org/presentationml/2006/main">
+  <p:cSld>
+    <p:spTree>
+      <p:nvGrpSpPr>
+        <p:cNvPr id="1" name=""/>
+        <p:cNvGrpSpPr/>
+        <p:nvPr/>
+      </p:nvGrpSpPr>
+      <p:grpSpPr>
+        <a:xfrm>
+          <a:off x="0" y="0"/>
+          <a:ext cx="0" cy="0"/>
+          <a:chOff x="0" y="0"/>
+          <a:chExt cx="0" cy="0"/>
+        </a:xfrm>
+      </p:grpSpPr>
+      <p:pic>
+        <p:nvPicPr>
+          <p:cNvPr id="5" name="Imagen 4">
+            <a:extLst>
+              <a:ext uri="{FF2B5EF4-FFF2-40B4-BE49-F238E27FC236}">
+                <a16:creationId xmlns:a16="http://schemas.microsoft.com/office/drawing/2014/main" id="{B625693B-54A6-4BF9-89E7-64AAB3449AF6}"/>
+              </a:ext>
+            </a:extLst>
+          </p:cNvPr>
+          <p:cNvPicPr>
+            <a:picLocks noChangeAspect="1"/>
+          </p:cNvPicPr>
+          <p:nvPr/>
+        </p:nvPicPr>
+        <p:blipFill>
+          <a:blip r:embed="rId2">
+            <a:extLst>
+              <a:ext uri="{28A0092B-C50C-407E-A947-70E740481C1C}">
+                <a14:useLocalDpi xmlns:a14="http://schemas.microsoft.com/office/drawing/2010/main" val="0"/>
+              </a:ext>
+            </a:extLst>
+          </a:blip>
+          <a:stretch>
+            <a:fillRect/>
+          </a:stretch>
+        </p:blipFill>
+        <p:spPr>
+          <a:xfrm>
+            <a:off x="299357" y="0"/>
+            <a:ext cx="11593286" cy="6858000"/>
+          </a:xfrm>
+          <a:prstGeom prst="rect">
+            <a:avLst/>
+          </a:prstGeom>
+        </p:spPr>
+      </p:pic>
+    </p:spTree>
+    <p:extLst>
+      <p:ext uri="{BB962C8B-B14F-4D97-AF65-F5344CB8AC3E}">
+        <p14:creationId xmlns:p14="http://schemas.microsoft.com/office/powerpoint/2010/main" val="930327223"/>
+      </p:ext>
+    </p:extLst>
+  </p:cSld>
+  <p:clrMapOvr>
+    <a:masterClrMapping/>
+  </p:clrMapOvr>
+</p:sld>
+</file>
+
+<file path=ppt/slides/slide14.xml><?xml version="1.0" encoding="utf-8"?>
+<p:sld xmlns:a="http://schemas.openxmlformats.org/drawingml/2006/main" xmlns:r="http://schemas.openxmlformats.org/officeDocument/2006/relationships" xmlns:p="http://schemas.openxmlformats.org/presentationml/2006/main">
+  <p:cSld>
+    <p:spTree>
+      <p:nvGrpSpPr>
+        <p:cNvPr id="1" name=""/>
+        <p:cNvGrpSpPr/>
+        <p:nvPr/>
+      </p:nvGrpSpPr>
+      <p:grpSpPr>
+        <a:xfrm>
+          <a:off x="0" y="0"/>
+          <a:ext cx="0" cy="0"/>
+          <a:chOff x="0" y="0"/>
+          <a:chExt cx="0" cy="0"/>
+        </a:xfrm>
+      </p:grpSpPr>
+      <p:pic>
+        <p:nvPicPr>
+          <p:cNvPr id="7" name="Imagen 6">
+            <a:extLst>
+              <a:ext uri="{FF2B5EF4-FFF2-40B4-BE49-F238E27FC236}">
+                <a16:creationId xmlns:a16="http://schemas.microsoft.com/office/drawing/2014/main" id="{6D952CC1-A5E1-40A2-9D13-1430C1310EAE}"/>
+              </a:ext>
+            </a:extLst>
+          </p:cNvPr>
+          <p:cNvPicPr>
+            <a:picLocks noChangeAspect="1"/>
+          </p:cNvPicPr>
+          <p:nvPr/>
+        </p:nvPicPr>
+        <p:blipFill>
+          <a:blip r:embed="rId2">
+            <a:extLst>
+              <a:ext uri="{28A0092B-C50C-407E-A947-70E740481C1C}">
+                <a14:useLocalDpi xmlns:a14="http://schemas.microsoft.com/office/drawing/2010/main" val="0"/>
+              </a:ext>
+            </a:extLst>
+          </a:blip>
+          <a:stretch>
+            <a:fillRect/>
+          </a:stretch>
+        </p:blipFill>
+        <p:spPr>
+          <a:xfrm>
+            <a:off x="2263741" y="146756"/>
+            <a:ext cx="6919452" cy="6858000"/>
+          </a:xfrm>
+          <a:prstGeom prst="rect">
+            <a:avLst/>
+          </a:prstGeom>
+        </p:spPr>
+      </p:pic>
+    </p:spTree>
+    <p:extLst>
+      <p:ext uri="{BB962C8B-B14F-4D97-AF65-F5344CB8AC3E}">
+        <p14:creationId xmlns:p14="http://schemas.microsoft.com/office/powerpoint/2010/main" val="1015662829"/>
+      </p:ext>
+    </p:extLst>
+  </p:cSld>
+  <p:clrMapOvr>
+    <a:masterClrMapping/>
+  </p:clrMapOvr>
+</p:sld>
+</file>
+
+<file path=ppt/slides/slide15.xml><?xml version="1.0" encoding="utf-8"?>
+<p:sld xmlns:a="http://schemas.openxmlformats.org/drawingml/2006/main" xmlns:r="http://schemas.openxmlformats.org/officeDocument/2006/relationships" xmlns:p="http://schemas.openxmlformats.org/presentationml/2006/main">
+  <p:cSld>
+    <p:spTree>
+      <p:nvGrpSpPr>
+        <p:cNvPr id="1" name=""/>
+        <p:cNvGrpSpPr/>
+        <p:nvPr/>
+      </p:nvGrpSpPr>
+      <p:grpSpPr>
+        <a:xfrm>
+          <a:off x="0" y="0"/>
+          <a:ext cx="0" cy="0"/>
+          <a:chOff x="0" y="0"/>
+          <a:chExt cx="0" cy="0"/>
+        </a:xfrm>
+      </p:grpSpPr>
+      <p:sp>
+        <p:nvSpPr>
+          <p:cNvPr id="6" name="CuadroTexto 5">
+            <a:extLst>
+              <a:ext uri="{FF2B5EF4-FFF2-40B4-BE49-F238E27FC236}">
+                <a16:creationId xmlns:a16="http://schemas.microsoft.com/office/drawing/2014/main" id="{932F9725-9378-4F7C-AB21-82DFDE890B1B}"/>
+              </a:ext>
+            </a:extLst>
+          </p:cNvPr>
+          <p:cNvSpPr txBox="1"/>
+          <p:nvPr/>
+        </p:nvSpPr>
+        <p:spPr>
+          <a:xfrm>
+            <a:off x="2936978" y="113421"/>
+            <a:ext cx="6318044" cy="523220"/>
+          </a:xfrm>
+          <a:prstGeom prst="rect">
+            <a:avLst/>
+          </a:prstGeom>
+          <a:noFill/>
+        </p:spPr>
+        <p:txBody>
+          <a:bodyPr wrap="square" rtlCol="0">
+            <a:spAutoFit/>
+          </a:bodyPr>
+          <a:lstStyle/>
+          <a:p>
+            <a:pPr algn="ctr"/>
+            <a:r>
+              <a:rPr lang="es-ES" sz="2800" b="1" dirty="0">
+                <a:solidFill>
+                  <a:srgbClr val="0070C0"/>
+                </a:solidFill>
+                <a:latin typeface="Arial" panose="020B0604020202020204" pitchFamily="34" charset="0"/>
+                <a:cs typeface="Arial" panose="020B0604020202020204" pitchFamily="34" charset="0"/>
+              </a:rPr>
+              <a:t>C</a:t>
+            </a:r>
+            <a:r>
+              <a:rPr lang="es-CO" sz="2800" b="1" dirty="0">
+                <a:solidFill>
+                  <a:srgbClr val="0070C0"/>
+                </a:solidFill>
+                <a:latin typeface="Arial" panose="020B0604020202020204" pitchFamily="34" charset="0"/>
+                <a:cs typeface="Arial" panose="020B0604020202020204" pitchFamily="34" charset="0"/>
+              </a:rPr>
+              <a:t>ONTROL DE VERSIONES GITHUB</a:t>
+            </a:r>
+          </a:p>
+        </p:txBody>
+      </p:sp>
+      <p:pic>
+        <p:nvPicPr>
+          <p:cNvPr id="7" name="Imagen 6">
+            <a:hlinkClick r:id="rId2"/>
+            <a:extLst>
+              <a:ext uri="{FF2B5EF4-FFF2-40B4-BE49-F238E27FC236}">
+                <a16:creationId xmlns:a16="http://schemas.microsoft.com/office/drawing/2014/main" id="{DA54780C-67EE-4EF4-8E34-D4272667A143}"/>
+              </a:ext>
+            </a:extLst>
+          </p:cNvPr>
+          <p:cNvPicPr>
+            <a:picLocks noChangeAspect="1"/>
+          </p:cNvPicPr>
+          <p:nvPr/>
+        </p:nvPicPr>
+        <p:blipFill>
+          <a:blip r:embed="rId3"/>
+          <a:stretch>
+            <a:fillRect/>
+          </a:stretch>
+        </p:blipFill>
+        <p:spPr>
+          <a:xfrm>
+            <a:off x="2342550" y="943503"/>
+            <a:ext cx="7506900" cy="4554186"/>
+          </a:xfrm>
+          <a:prstGeom prst="rect">
+            <a:avLst/>
+          </a:prstGeom>
+        </p:spPr>
+      </p:pic>
+    </p:spTree>
+    <p:extLst>
+      <p:ext uri="{BB962C8B-B14F-4D97-AF65-F5344CB8AC3E}">
+        <p14:creationId xmlns:p14="http://schemas.microsoft.com/office/powerpoint/2010/main" val="3666711712"/>
+      </p:ext>
+    </p:extLst>
+  </p:cSld>
+  <p:clrMapOvr>
+    <a:masterClrMapping/>
+  </p:clrMapOvr>
+</p:sld>
+</file>
+
+<file path=ppt/slides/slide16.xml><?xml version="1.0" encoding="utf-8"?>
 <p:sld xmlns:a="http://schemas.openxmlformats.org/drawingml/2006/main" xmlns:r="http://schemas.openxmlformats.org/officeDocument/2006/relationships" xmlns:p="http://schemas.openxmlformats.org/presentationml/2006/main">
   <p:cSld>
     <p:spTree>

</xml_diff>

<commit_message>
edicion de plantilla 6
</commit_message>
<xml_diff>
--- a/PLANTILLA_PRESENTACION_AVANCES_PROYECTO_.pptx
+++ b/PLANTILLA_PRESENTACION_AVANCES_PROYECTO_.pptx
@@ -5,7 +5,7 @@
     <p:sldMasterId id="2147483648" r:id="rId1"/>
   </p:sldMasterIdLst>
   <p:notesMasterIdLst>
-    <p:notesMasterId r:id="rId24"/>
+    <p:notesMasterId r:id="rId27"/>
   </p:notesMasterIdLst>
   <p:sldIdLst>
     <p:sldId id="257" r:id="rId2"/>
@@ -29,7 +29,10 @@
     <p:sldId id="290" r:id="rId20"/>
     <p:sldId id="291" r:id="rId21"/>
     <p:sldId id="292" r:id="rId22"/>
-    <p:sldId id="273" r:id="rId23"/>
+    <p:sldId id="294" r:id="rId23"/>
+    <p:sldId id="295" r:id="rId24"/>
+    <p:sldId id="293" r:id="rId25"/>
+    <p:sldId id="273" r:id="rId26"/>
   </p:sldIdLst>
   <p:sldSz cx="12192000" cy="6858000"/>
   <p:notesSz cx="6858000" cy="9144000"/>
@@ -388,7 +391,7 @@
           <a:p>
             <a:fld id="{9F8AA230-26E9-4845-90B2-987FEDAD6952}" type="datetimeFigureOut">
               <a:rPr lang="es-CO" smtClean="0"/>
-              <a:t>3/12/2021</a:t>
+              <a:t>4/12/2021</a:t>
             </a:fld>
             <a:endParaRPr lang="es-CO"/>
           </a:p>
@@ -1255,6 +1258,239 @@
   <p:cSld>
     <p:spTree>
       <p:nvGrpSpPr>
+        <p:cNvPr id="1" name="Shape 121"/>
+        <p:cNvGrpSpPr/>
+        <p:nvPr/>
+      </p:nvGrpSpPr>
+      <p:grpSpPr>
+        <a:xfrm>
+          <a:off x="0" y="0"/>
+          <a:ext cx="0" cy="0"/>
+          <a:chOff x="0" y="0"/>
+          <a:chExt cx="0" cy="0"/>
+        </a:xfrm>
+      </p:grpSpPr>
+      <p:sp>
+        <p:nvSpPr>
+          <p:cNvPr id="122" name="Google Shape;122;p5:notes"/>
+          <p:cNvSpPr>
+            <a:spLocks noGrp="1" noRot="1" noChangeAspect="1"/>
+          </p:cNvSpPr>
+          <p:nvPr>
+            <p:ph type="sldImg" idx="2"/>
+          </p:nvPr>
+        </p:nvSpPr>
+        <p:spPr>
+          <a:xfrm>
+            <a:off x="381000" y="685800"/>
+            <a:ext cx="6096000" cy="3429000"/>
+          </a:xfrm>
+          <a:custGeom>
+            <a:avLst/>
+            <a:gdLst/>
+            <a:ahLst/>
+            <a:cxnLst/>
+            <a:rect l="l" t="t" r="r" b="b"/>
+            <a:pathLst>
+              <a:path w="120000" h="120000" extrusionOk="0">
+                <a:moveTo>
+                  <a:pt x="0" y="0"/>
+                </a:moveTo>
+                <a:lnTo>
+                  <a:pt x="120000" y="0"/>
+                </a:lnTo>
+                <a:lnTo>
+                  <a:pt x="120000" y="120000"/>
+                </a:lnTo>
+                <a:lnTo>
+                  <a:pt x="0" y="120000"/>
+                </a:lnTo>
+                <a:close/>
+              </a:path>
+            </a:pathLst>
+          </a:custGeom>
+          <a:noFill/>
+          <a:ln w="12700" cap="flat" cmpd="sng">
+            <a:solidFill>
+              <a:srgbClr val="000000"/>
+            </a:solidFill>
+            <a:prstDash val="solid"/>
+            <a:round/>
+            <a:headEnd type="none" w="sm" len="sm"/>
+            <a:tailEnd type="none" w="sm" len="sm"/>
+          </a:ln>
+        </p:spPr>
+      </p:sp>
+      <p:sp>
+        <p:nvSpPr>
+          <p:cNvPr id="123" name="Google Shape;123;p5:notes"/>
+          <p:cNvSpPr txBox="1">
+            <a:spLocks noGrp="1"/>
+          </p:cNvSpPr>
+          <p:nvPr>
+            <p:ph type="body" idx="1"/>
+          </p:nvPr>
+        </p:nvSpPr>
+        <p:spPr>
+          <a:xfrm>
+            <a:off x="685800" y="4343400"/>
+            <a:ext cx="5486400" cy="4114800"/>
+          </a:xfrm>
+          <a:prstGeom prst="rect">
+            <a:avLst/>
+          </a:prstGeom>
+          <a:noFill/>
+          <a:ln>
+            <a:noFill/>
+          </a:ln>
+        </p:spPr>
+        <p:txBody>
+          <a:bodyPr spcFirstLastPara="1" wrap="square" lIns="91425" tIns="45700" rIns="91425" bIns="45700" anchor="t" anchorCtr="0">
+            <a:noAutofit/>
+          </a:bodyPr>
+          <a:lstStyle/>
+          <a:p>
+            <a:pPr marL="171450" lvl="0" indent="-171450" algn="l" rtl="0">
+              <a:lnSpc>
+                <a:spcPct val="100000"/>
+              </a:lnSpc>
+              <a:spcBef>
+                <a:spcPts val="0"/>
+              </a:spcBef>
+              <a:spcAft>
+                <a:spcPts val="0"/>
+              </a:spcAft>
+              <a:buClr>
+                <a:schemeClr val="dk1"/>
+              </a:buClr>
+              <a:buSzPts val="1200"/>
+              <a:buFont typeface="Calibri"/>
+              <a:buChar char="-"/>
+            </a:pPr>
+            <a:r>
+              <a:rPr lang="es-ES" dirty="0"/>
+              <a:t>Utilice esta diapositiva si necesita incluir textos más extensos.</a:t>
+            </a:r>
+            <a:endParaRPr dirty="0"/>
+          </a:p>
+          <a:p>
+            <a:pPr marL="171450" lvl="0" indent="-171450" algn="l" rtl="0">
+              <a:lnSpc>
+                <a:spcPct val="100000"/>
+              </a:lnSpc>
+              <a:spcBef>
+                <a:spcPts val="0"/>
+              </a:spcBef>
+              <a:spcAft>
+                <a:spcPts val="0"/>
+              </a:spcAft>
+              <a:buClr>
+                <a:schemeClr val="dk1"/>
+              </a:buClr>
+              <a:buSzPts val="1200"/>
+              <a:buFont typeface="Calibri"/>
+              <a:buChar char="-"/>
+            </a:pPr>
+            <a:r>
+              <a:rPr lang="es-ES" dirty="0"/>
+              <a:t>Los textos deben ir en azul (utilice el azul que aparece en la opciones de color de letra - -&gt; colores recientes) en tipografía Arial y justificados.</a:t>
+            </a:r>
+            <a:endParaRPr dirty="0"/>
+          </a:p>
+          <a:p>
+            <a:pPr marL="171450" lvl="0" indent="-171450" algn="l" rtl="0">
+              <a:lnSpc>
+                <a:spcPct val="100000"/>
+              </a:lnSpc>
+              <a:spcBef>
+                <a:spcPts val="0"/>
+              </a:spcBef>
+              <a:spcAft>
+                <a:spcPts val="0"/>
+              </a:spcAft>
+              <a:buClr>
+                <a:schemeClr val="dk1"/>
+              </a:buClr>
+              <a:buSzPts val="1200"/>
+              <a:buFont typeface="Calibri"/>
+              <a:buChar char="-"/>
+            </a:pPr>
+            <a:r>
+              <a:rPr lang="es-ES" dirty="0"/>
+              <a:t>Asegúrese que los textos no se monten sobre la franja verde.</a:t>
+            </a:r>
+            <a:endParaRPr dirty="0"/>
+          </a:p>
+        </p:txBody>
+      </p:sp>
+      <p:sp>
+        <p:nvSpPr>
+          <p:cNvPr id="124" name="Google Shape;124;p5:notes"/>
+          <p:cNvSpPr txBox="1">
+            <a:spLocks noGrp="1"/>
+          </p:cNvSpPr>
+          <p:nvPr>
+            <p:ph type="sldNum" idx="12"/>
+          </p:nvPr>
+        </p:nvSpPr>
+        <p:spPr>
+          <a:xfrm>
+            <a:off x="3884613" y="8685213"/>
+            <a:ext cx="2971800" cy="457200"/>
+          </a:xfrm>
+          <a:prstGeom prst="rect">
+            <a:avLst/>
+          </a:prstGeom>
+          <a:noFill/>
+          <a:ln>
+            <a:noFill/>
+          </a:ln>
+        </p:spPr>
+        <p:txBody>
+          <a:bodyPr spcFirstLastPara="1" wrap="square" lIns="91425" tIns="45700" rIns="91425" bIns="45700" anchor="b" anchorCtr="0">
+            <a:noAutofit/>
+          </a:bodyPr>
+          <a:lstStyle/>
+          <a:p>
+            <a:pPr marL="0" lvl="0" indent="0" algn="r" rtl="0">
+              <a:lnSpc>
+                <a:spcPct val="100000"/>
+              </a:lnSpc>
+              <a:spcBef>
+                <a:spcPts val="0"/>
+              </a:spcBef>
+              <a:spcAft>
+                <a:spcPts val="0"/>
+              </a:spcAft>
+              <a:buSzPts val="1400"/>
+              <a:buNone/>
+            </a:pPr>
+            <a:fld id="{00000000-1234-1234-1234-123412341234}" type="slidenum">
+              <a:rPr lang="es-ES"/>
+              <a:t>24</a:t>
+            </a:fld>
+            <a:endParaRPr/>
+          </a:p>
+        </p:txBody>
+      </p:sp>
+    </p:spTree>
+    <p:extLst>
+      <p:ext uri="{BB962C8B-B14F-4D97-AF65-F5344CB8AC3E}">
+        <p14:creationId xmlns:p14="http://schemas.microsoft.com/office/powerpoint/2010/main" val="549059945"/>
+      </p:ext>
+    </p:extLst>
+  </p:cSld>
+  <p:clrMapOvr>
+    <a:masterClrMapping/>
+  </p:clrMapOvr>
+</p:notes>
+</file>
+
+<file path=ppt/notesSlides/notesSlide13.xml><?xml version="1.0" encoding="utf-8"?>
+<p:notes xmlns:a="http://schemas.openxmlformats.org/drawingml/2006/main" xmlns:r="http://schemas.openxmlformats.org/officeDocument/2006/relationships" xmlns:p="http://schemas.openxmlformats.org/presentationml/2006/main" showMasterSp="0" showMasterPhAnim="0">
+  <p:cSld>
+    <p:spTree>
+      <p:nvGrpSpPr>
         <p:cNvPr id="1" name="Shape 186"/>
         <p:cNvGrpSpPr/>
         <p:nvPr/>
@@ -1440,7 +1676,7 @@
             </a:pPr>
             <a:fld id="{00000000-1234-1234-1234-123412341234}" type="slidenum">
               <a:rPr lang="es-ES"/>
-              <a:t>22</a:t>
+              <a:t>25</a:t>
             </a:fld>
             <a:endParaRPr/>
           </a:p>
@@ -3407,7 +3643,7 @@
           <a:p>
             <a:fld id="{45896B23-B6B7-4DC1-BF89-EF3D7CBACBEB}" type="datetimeFigureOut">
               <a:rPr lang="es-CO" smtClean="0"/>
-              <a:t>3/12/2021</a:t>
+              <a:t>4/12/2021</a:t>
             </a:fld>
             <a:endParaRPr lang="es-CO"/>
           </a:p>
@@ -3607,7 +3843,7 @@
           <a:p>
             <a:fld id="{45896B23-B6B7-4DC1-BF89-EF3D7CBACBEB}" type="datetimeFigureOut">
               <a:rPr lang="es-CO" smtClean="0"/>
-              <a:t>3/12/2021</a:t>
+              <a:t>4/12/2021</a:t>
             </a:fld>
             <a:endParaRPr lang="es-CO"/>
           </a:p>
@@ -3817,7 +4053,7 @@
           <a:p>
             <a:fld id="{45896B23-B6B7-4DC1-BF89-EF3D7CBACBEB}" type="datetimeFigureOut">
               <a:rPr lang="es-CO" smtClean="0"/>
-              <a:t>3/12/2021</a:t>
+              <a:t>4/12/2021</a:t>
             </a:fld>
             <a:endParaRPr lang="es-CO"/>
           </a:p>
@@ -4302,7 +4538,7 @@
           <a:p>
             <a:fld id="{45896B23-B6B7-4DC1-BF89-EF3D7CBACBEB}" type="datetimeFigureOut">
               <a:rPr lang="es-CO" smtClean="0"/>
-              <a:t>3/12/2021</a:t>
+              <a:t>4/12/2021</a:t>
             </a:fld>
             <a:endParaRPr lang="es-CO"/>
           </a:p>
@@ -4578,7 +4814,7 @@
           <a:p>
             <a:fld id="{45896B23-B6B7-4DC1-BF89-EF3D7CBACBEB}" type="datetimeFigureOut">
               <a:rPr lang="es-CO" smtClean="0"/>
-              <a:t>3/12/2021</a:t>
+              <a:t>4/12/2021</a:t>
             </a:fld>
             <a:endParaRPr lang="es-CO"/>
           </a:p>
@@ -4846,7 +5082,7 @@
           <a:p>
             <a:fld id="{45896B23-B6B7-4DC1-BF89-EF3D7CBACBEB}" type="datetimeFigureOut">
               <a:rPr lang="es-CO" smtClean="0"/>
-              <a:t>3/12/2021</a:t>
+              <a:t>4/12/2021</a:t>
             </a:fld>
             <a:endParaRPr lang="es-CO"/>
           </a:p>
@@ -5261,7 +5497,7 @@
           <a:p>
             <a:fld id="{45896B23-B6B7-4DC1-BF89-EF3D7CBACBEB}" type="datetimeFigureOut">
               <a:rPr lang="es-CO" smtClean="0"/>
-              <a:t>3/12/2021</a:t>
+              <a:t>4/12/2021</a:t>
             </a:fld>
             <a:endParaRPr lang="es-CO"/>
           </a:p>
@@ -5403,7 +5639,7 @@
           <a:p>
             <a:fld id="{45896B23-B6B7-4DC1-BF89-EF3D7CBACBEB}" type="datetimeFigureOut">
               <a:rPr lang="es-CO" smtClean="0"/>
-              <a:t>3/12/2021</a:t>
+              <a:t>4/12/2021</a:t>
             </a:fld>
             <a:endParaRPr lang="es-CO"/>
           </a:p>
@@ -5516,7 +5752,7 @@
           <a:p>
             <a:fld id="{45896B23-B6B7-4DC1-BF89-EF3D7CBACBEB}" type="datetimeFigureOut">
               <a:rPr lang="es-CO" smtClean="0"/>
-              <a:t>3/12/2021</a:t>
+              <a:t>4/12/2021</a:t>
             </a:fld>
             <a:endParaRPr lang="es-CO"/>
           </a:p>
@@ -5829,7 +6065,7 @@
           <a:p>
             <a:fld id="{45896B23-B6B7-4DC1-BF89-EF3D7CBACBEB}" type="datetimeFigureOut">
               <a:rPr lang="es-CO" smtClean="0"/>
-              <a:t>3/12/2021</a:t>
+              <a:t>4/12/2021</a:t>
             </a:fld>
             <a:endParaRPr lang="es-CO"/>
           </a:p>
@@ -6118,7 +6354,7 @@
           <a:p>
             <a:fld id="{45896B23-B6B7-4DC1-BF89-EF3D7CBACBEB}" type="datetimeFigureOut">
               <a:rPr lang="es-CO" smtClean="0"/>
-              <a:t>3/12/2021</a:t>
+              <a:t>4/12/2021</a:t>
             </a:fld>
             <a:endParaRPr lang="es-CO"/>
           </a:p>
@@ -6361,7 +6597,7 @@
           <a:p>
             <a:fld id="{45896B23-B6B7-4DC1-BF89-EF3D7CBACBEB}" type="datetimeFigureOut">
               <a:rPr lang="es-CO" smtClean="0"/>
-              <a:t>3/12/2021</a:t>
+              <a:t>4/12/2021</a:t>
             </a:fld>
             <a:endParaRPr lang="es-CO"/>
           </a:p>
@@ -7070,6 +7306,7 @@
       <p:sp>
         <p:nvSpPr>
           <p:cNvPr id="10" name="CuadroTexto 9">
+            <a:hlinkClick r:id="rId5" action="ppaction://hlinkfile"/>
             <a:extLst>
               <a:ext uri="{FF2B5EF4-FFF2-40B4-BE49-F238E27FC236}">
                 <a16:creationId xmlns:a16="http://schemas.microsoft.com/office/drawing/2014/main" id="{CB45A7F1-13BC-4A87-94BB-6BCF71E7B80F}"/>
@@ -7081,8 +7318,8 @@
         </p:nvSpPr>
         <p:spPr>
           <a:xfrm>
-            <a:off x="4775201" y="6023429"/>
-            <a:ext cx="2888342" cy="646331"/>
+            <a:off x="3726873" y="5575336"/>
+            <a:ext cx="4391891" cy="369332"/>
           </a:xfrm>
           <a:prstGeom prst="rect">
             <a:avLst/>
@@ -7095,16 +7332,24 @@
           </a:bodyPr>
           <a:lstStyle/>
           <a:p>
-            <a:r>
-              <a:rPr lang="es-CO" dirty="0">
+            <a:pPr algn="ctr"/>
+            <a:r>
+              <a:rPr lang="es-CO" b="1" dirty="0" smtClean="0">
                 <a:solidFill>
                   <a:srgbClr val="0070C0"/>
                 </a:solidFill>
                 <a:latin typeface="Arial" panose="020B0604020202020204" pitchFamily="34" charset="0"/>
                 <a:cs typeface="Arial" panose="020B0604020202020204" pitchFamily="34" charset="0"/>
               </a:rPr>
-              <a:t>DOCUMENTO(agregar vinculo)</a:t>
-            </a:r>
+              <a:t>DOCUMENTO</a:t>
+            </a:r>
+            <a:endParaRPr lang="es-CO" b="1" dirty="0">
+              <a:solidFill>
+                <a:srgbClr val="0070C0"/>
+              </a:solidFill>
+              <a:latin typeface="Arial" panose="020B0604020202020204" pitchFamily="34" charset="0"/>
+              <a:cs typeface="Arial" panose="020B0604020202020204" pitchFamily="34" charset="0"/>
+            </a:endParaRPr>
           </a:p>
         </p:txBody>
       </p:sp>
@@ -8237,6 +8482,12 @@
                     <a:lstStyle/>
                     <a:p>
                       <a:pPr fontAlgn="t"/>
+                      <a:r>
+                        <a:rPr lang="en-US" sz="1600" dirty="0">
+                          <a:effectLst/>
+                        </a:rPr>
+                        <a:t/>
+                      </a:r>
                       <a:br>
                         <a:rPr lang="en-US" sz="1600" dirty="0">
                           <a:effectLst/>
@@ -9326,6 +9577,12 @@
                     <a:lstStyle/>
                     <a:p>
                       <a:pPr fontAlgn="t"/>
+                      <a:r>
+                        <a:rPr lang="en-US" sz="1600" dirty="0">
+                          <a:effectLst/>
+                        </a:rPr>
+                        <a:t/>
+                      </a:r>
                       <a:br>
                         <a:rPr lang="en-US" sz="1600" dirty="0">
                           <a:effectLst/>
@@ -10425,6 +10682,12 @@
                     <a:lstStyle/>
                     <a:p>
                       <a:pPr fontAlgn="t"/>
+                      <a:r>
+                        <a:rPr lang="en-US" sz="1600" dirty="0">
+                          <a:effectLst/>
+                        </a:rPr>
+                        <a:t/>
+                      </a:r>
                       <a:br>
                         <a:rPr lang="en-US" sz="1600" dirty="0">
                           <a:effectLst/>
@@ -13862,6 +14125,510 @@
 </file>
 
 <file path=ppt/slides/slide22.xml><?xml version="1.0" encoding="utf-8"?>
+<p:sld xmlns:a="http://schemas.openxmlformats.org/drawingml/2006/main" xmlns:r="http://schemas.openxmlformats.org/officeDocument/2006/relationships" xmlns:p="http://schemas.openxmlformats.org/presentationml/2006/main">
+  <p:cSld>
+    <p:spTree>
+      <p:nvGrpSpPr>
+        <p:cNvPr id="1" name=""/>
+        <p:cNvGrpSpPr/>
+        <p:nvPr/>
+      </p:nvGrpSpPr>
+      <p:grpSpPr>
+        <a:xfrm>
+          <a:off x="0" y="0"/>
+          <a:ext cx="0" cy="0"/>
+          <a:chOff x="0" y="0"/>
+          <a:chExt cx="0" cy="0"/>
+        </a:xfrm>
+      </p:grpSpPr>
+      <p:sp>
+        <p:nvSpPr>
+          <p:cNvPr id="3" name="Rectangle 1"/>
+          <p:cNvSpPr>
+            <a:spLocks noChangeArrowheads="1"/>
+          </p:cNvSpPr>
+          <p:nvPr/>
+        </p:nvSpPr>
+        <p:spPr bwMode="auto">
+          <a:xfrm>
+            <a:off x="3386138" y="2674938"/>
+            <a:ext cx="12192000" cy="457200"/>
+          </a:xfrm>
+          <a:prstGeom prst="rect">
+            <a:avLst/>
+          </a:prstGeom>
+          <a:noFill/>
+          <a:ln>
+            <a:noFill/>
+          </a:ln>
+          <a:effectLst/>
+          <a:extLst>
+            <a:ext uri="{909E8E84-426E-40DD-AFC4-6F175D3DCCD1}">
+              <a14:hiddenFill xmlns:a14="http://schemas.microsoft.com/office/drawing/2010/main">
+                <a:solidFill>
+                  <a:schemeClr val="accent1"/>
+                </a:solidFill>
+              </a14:hiddenFill>
+            </a:ext>
+            <a:ext uri="{91240B29-F687-4F45-9708-019B960494DF}">
+              <a14:hiddenLine xmlns:a14="http://schemas.microsoft.com/office/drawing/2010/main" w="9525">
+                <a:solidFill>
+                  <a:schemeClr val="tx1"/>
+                </a:solidFill>
+                <a:miter lim="800000"/>
+                <a:headEnd/>
+                <a:tailEnd/>
+              </a14:hiddenLine>
+            </a:ext>
+            <a:ext uri="{AF507438-7753-43E0-B8FC-AC1667EBCBE1}">
+              <a14:hiddenEffects xmlns:a14="http://schemas.microsoft.com/office/drawing/2010/main">
+                <a:effectLst>
+                  <a:outerShdw dist="35921" dir="2700000" algn="ctr" rotWithShape="0">
+                    <a:schemeClr val="bg2"/>
+                  </a:outerShdw>
+                </a:effectLst>
+              </a14:hiddenEffects>
+            </a:ext>
+          </a:extLst>
+        </p:spPr>
+        <p:txBody>
+          <a:bodyPr vert="horz" wrap="none" lIns="91440" tIns="45720" rIns="91440" bIns="45720" numCol="1" anchor="ctr" anchorCtr="0" compatLnSpc="1">
+            <a:prstTxWarp prst="textNoShape">
+              <a:avLst/>
+            </a:prstTxWarp>
+            <a:spAutoFit/>
+          </a:bodyPr>
+          <a:lstStyle/>
+          <a:p>
+            <a:endParaRPr lang="en-US"/>
+          </a:p>
+        </p:txBody>
+      </p:sp>
+      <p:sp>
+        <p:nvSpPr>
+          <p:cNvPr id="4" name="Rectangle 1">
+            <a:extLst>
+              <a:ext uri="{FF2B5EF4-FFF2-40B4-BE49-F238E27FC236}">
+                <a16:creationId xmlns:a16="http://schemas.microsoft.com/office/drawing/2014/main" id="{DBB4D4B1-5C46-4C55-AE58-6037EDDD64A0}"/>
+              </a:ext>
+            </a:extLst>
+          </p:cNvPr>
+          <p:cNvSpPr>
+            <a:spLocks noChangeArrowheads="1"/>
+          </p:cNvSpPr>
+          <p:nvPr/>
+        </p:nvSpPr>
+        <p:spPr bwMode="auto">
+          <a:xfrm>
+            <a:off x="3386138" y="2674938"/>
+            <a:ext cx="12192000" cy="457200"/>
+          </a:xfrm>
+          <a:prstGeom prst="rect">
+            <a:avLst/>
+          </a:prstGeom>
+          <a:noFill/>
+          <a:ln>
+            <a:noFill/>
+          </a:ln>
+          <a:effectLst/>
+          <a:extLst>
+            <a:ext uri="{909E8E84-426E-40DD-AFC4-6F175D3DCCD1}">
+              <a14:hiddenFill xmlns:a14="http://schemas.microsoft.com/office/drawing/2010/main">
+                <a:solidFill>
+                  <a:schemeClr val="accent1"/>
+                </a:solidFill>
+              </a14:hiddenFill>
+            </a:ext>
+            <a:ext uri="{91240B29-F687-4F45-9708-019B960494DF}">
+              <a14:hiddenLine xmlns:a14="http://schemas.microsoft.com/office/drawing/2010/main" w="9525">
+                <a:solidFill>
+                  <a:schemeClr val="tx1"/>
+                </a:solidFill>
+                <a:miter lim="800000"/>
+                <a:headEnd/>
+                <a:tailEnd/>
+              </a14:hiddenLine>
+            </a:ext>
+            <a:ext uri="{AF507438-7753-43E0-B8FC-AC1667EBCBE1}">
+              <a14:hiddenEffects xmlns:a14="http://schemas.microsoft.com/office/drawing/2010/main">
+                <a:effectLst>
+                  <a:outerShdw dist="35921" dir="2700000" algn="ctr" rotWithShape="0">
+                    <a:schemeClr val="bg2"/>
+                  </a:outerShdw>
+                </a:effectLst>
+              </a14:hiddenEffects>
+            </a:ext>
+          </a:extLst>
+        </p:spPr>
+        <p:txBody>
+          <a:bodyPr vert="horz" wrap="none" lIns="91440" tIns="45720" rIns="91440" bIns="45720" numCol="1" anchor="ctr" anchorCtr="0" compatLnSpc="1">
+            <a:prstTxWarp prst="textNoShape">
+              <a:avLst/>
+            </a:prstTxWarp>
+            <a:spAutoFit/>
+          </a:bodyPr>
+          <a:lstStyle/>
+          <a:p>
+            <a:endParaRPr lang="es-ES"/>
+          </a:p>
+        </p:txBody>
+      </p:sp>
+      <p:sp>
+        <p:nvSpPr>
+          <p:cNvPr id="6" name="CuadroTexto 5"/>
+          <p:cNvSpPr txBox="1"/>
+          <p:nvPr/>
+        </p:nvSpPr>
+        <p:spPr>
+          <a:xfrm>
+            <a:off x="1500188" y="685799"/>
+            <a:ext cx="8515350" cy="646331"/>
+          </a:xfrm>
+          <a:prstGeom prst="rect">
+            <a:avLst/>
+          </a:prstGeom>
+          <a:noFill/>
+        </p:spPr>
+        <p:txBody>
+          <a:bodyPr wrap="square" rtlCol="0">
+            <a:spAutoFit/>
+          </a:bodyPr>
+          <a:lstStyle/>
+          <a:p>
+            <a:pPr algn="ctr"/>
+            <a:r>
+              <a:rPr lang="es-CO" sz="3600" b="1" dirty="0" smtClean="0">
+                <a:solidFill>
+                  <a:srgbClr val="0070C0"/>
+                </a:solidFill>
+              </a:rPr>
+              <a:t>DIAGRAMA GENERAL</a:t>
+            </a:r>
+            <a:endParaRPr lang="en-US" sz="3600" b="1" dirty="0">
+              <a:solidFill>
+                <a:srgbClr val="0070C0"/>
+              </a:solidFill>
+            </a:endParaRPr>
+          </a:p>
+        </p:txBody>
+      </p:sp>
+      <p:pic>
+        <p:nvPicPr>
+          <p:cNvPr id="7" name="Imagen 6">
+            <a:hlinkClick r:id="rId2" action="ppaction://hlinkfile"/>
+          </p:cNvPr>
+          <p:cNvPicPr>
+            <a:picLocks noChangeAspect="1"/>
+          </p:cNvPicPr>
+          <p:nvPr/>
+        </p:nvPicPr>
+        <p:blipFill>
+          <a:blip r:embed="rId3">
+            <a:extLst>
+              <a:ext uri="{28A0092B-C50C-407E-A947-70E740481C1C}">
+                <a14:useLocalDpi xmlns:a14="http://schemas.microsoft.com/office/drawing/2010/main" val="0"/>
+              </a:ext>
+            </a:extLst>
+          </a:blip>
+          <a:stretch>
+            <a:fillRect/>
+          </a:stretch>
+        </p:blipFill>
+        <p:spPr>
+          <a:xfrm>
+            <a:off x="1118337" y="1485901"/>
+            <a:ext cx="10058400" cy="4643438"/>
+          </a:xfrm>
+          <a:prstGeom prst="rect">
+            <a:avLst/>
+          </a:prstGeom>
+        </p:spPr>
+      </p:pic>
+    </p:spTree>
+    <p:extLst>
+      <p:ext uri="{BB962C8B-B14F-4D97-AF65-F5344CB8AC3E}">
+        <p14:creationId xmlns:p14="http://schemas.microsoft.com/office/powerpoint/2010/main" val="1568686128"/>
+      </p:ext>
+    </p:extLst>
+  </p:cSld>
+  <p:clrMapOvr>
+    <a:masterClrMapping/>
+  </p:clrMapOvr>
+</p:sld>
+</file>
+
+<file path=ppt/slides/slide23.xml><?xml version="1.0" encoding="utf-8"?>
+<p:sld xmlns:a="http://schemas.openxmlformats.org/drawingml/2006/main" xmlns:r="http://schemas.openxmlformats.org/officeDocument/2006/relationships" xmlns:p="http://schemas.openxmlformats.org/presentationml/2006/main">
+  <p:cSld>
+    <p:spTree>
+      <p:nvGrpSpPr>
+        <p:cNvPr id="1" name=""/>
+        <p:cNvGrpSpPr/>
+        <p:nvPr/>
+      </p:nvGrpSpPr>
+      <p:grpSpPr>
+        <a:xfrm>
+          <a:off x="0" y="0"/>
+          <a:ext cx="0" cy="0"/>
+          <a:chOff x="0" y="0"/>
+          <a:chExt cx="0" cy="0"/>
+        </a:xfrm>
+      </p:grpSpPr>
+      <p:sp>
+        <p:nvSpPr>
+          <p:cNvPr id="2" name="CuadroTexto 1"/>
+          <p:cNvSpPr txBox="1"/>
+          <p:nvPr/>
+        </p:nvSpPr>
+        <p:spPr>
+          <a:xfrm>
+            <a:off x="2618508" y="734290"/>
+            <a:ext cx="6497781" cy="461665"/>
+          </a:xfrm>
+          <a:prstGeom prst="rect">
+            <a:avLst/>
+          </a:prstGeom>
+          <a:noFill/>
+        </p:spPr>
+        <p:txBody>
+          <a:bodyPr wrap="square" rtlCol="0">
+            <a:spAutoFit/>
+          </a:bodyPr>
+          <a:lstStyle/>
+          <a:p>
+            <a:pPr algn="ctr"/>
+            <a:r>
+              <a:rPr lang="es-CO" sz="2400" b="1" dirty="0" smtClean="0">
+                <a:solidFill>
+                  <a:srgbClr val="0070C0"/>
+                </a:solidFill>
+                <a:latin typeface="Arial" panose="020B0604020202020204" pitchFamily="34" charset="0"/>
+                <a:cs typeface="Arial" panose="020B0604020202020204" pitchFamily="34" charset="0"/>
+              </a:rPr>
+              <a:t>DOCUMENTACION DE CASOS DE USO</a:t>
+            </a:r>
+            <a:endParaRPr lang="en-US" sz="2400" b="1" dirty="0">
+              <a:solidFill>
+                <a:srgbClr val="0070C0"/>
+              </a:solidFill>
+              <a:latin typeface="Arial" panose="020B0604020202020204" pitchFamily="34" charset="0"/>
+              <a:cs typeface="Arial" panose="020B0604020202020204" pitchFamily="34" charset="0"/>
+            </a:endParaRPr>
+          </a:p>
+        </p:txBody>
+      </p:sp>
+      <p:pic>
+        <p:nvPicPr>
+          <p:cNvPr id="3" name="Imagen 2">
+            <a:hlinkClick r:id="rId2" action="ppaction://hlinkfile"/>
+          </p:cNvPr>
+          <p:cNvPicPr>
+            <a:picLocks noChangeAspect="1"/>
+          </p:cNvPicPr>
+          <p:nvPr/>
+        </p:nvPicPr>
+        <p:blipFill>
+          <a:blip r:embed="rId3">
+            <a:extLst>
+              <a:ext uri="{28A0092B-C50C-407E-A947-70E740481C1C}">
+                <a14:useLocalDpi xmlns:a14="http://schemas.microsoft.com/office/drawing/2010/main" val="0"/>
+              </a:ext>
+            </a:extLst>
+          </a:blip>
+          <a:stretch>
+            <a:fillRect/>
+          </a:stretch>
+        </p:blipFill>
+        <p:spPr>
+          <a:xfrm>
+            <a:off x="1742467" y="1496291"/>
+            <a:ext cx="8707065" cy="4604844"/>
+          </a:xfrm>
+          <a:prstGeom prst="rect">
+            <a:avLst/>
+          </a:prstGeom>
+        </p:spPr>
+      </p:pic>
+    </p:spTree>
+    <p:extLst>
+      <p:ext uri="{BB962C8B-B14F-4D97-AF65-F5344CB8AC3E}">
+        <p14:creationId xmlns:p14="http://schemas.microsoft.com/office/powerpoint/2010/main" val="108793322"/>
+      </p:ext>
+    </p:extLst>
+  </p:cSld>
+  <p:clrMapOvr>
+    <a:masterClrMapping/>
+  </p:clrMapOvr>
+</p:sld>
+</file>
+
+<file path=ppt/slides/slide24.xml><?xml version="1.0" encoding="utf-8"?>
+<p:sld xmlns:a="http://schemas.openxmlformats.org/drawingml/2006/main" xmlns:r="http://schemas.openxmlformats.org/officeDocument/2006/relationships" xmlns:p="http://schemas.openxmlformats.org/presentationml/2006/main">
+  <p:cSld>
+    <p:spTree>
+      <p:nvGrpSpPr>
+        <p:cNvPr id="1" name="Shape 125"/>
+        <p:cNvGrpSpPr/>
+        <p:nvPr/>
+      </p:nvGrpSpPr>
+      <p:grpSpPr>
+        <a:xfrm>
+          <a:off x="0" y="0"/>
+          <a:ext cx="0" cy="0"/>
+          <a:chOff x="0" y="0"/>
+          <a:chExt cx="0" cy="0"/>
+        </a:xfrm>
+      </p:grpSpPr>
+      <p:sp>
+        <p:nvSpPr>
+          <p:cNvPr id="2" name="CuadroTexto 1">
+            <a:extLst>
+              <a:ext uri="{FF2B5EF4-FFF2-40B4-BE49-F238E27FC236}">
+                <a16:creationId xmlns:a16="http://schemas.microsoft.com/office/drawing/2014/main" id="{BC758410-DEA8-4A1F-AF32-CF4DA320955F}"/>
+              </a:ext>
+            </a:extLst>
+          </p:cNvPr>
+          <p:cNvSpPr txBox="1"/>
+          <p:nvPr/>
+        </p:nvSpPr>
+        <p:spPr>
+          <a:xfrm>
+            <a:off x="2065606" y="578560"/>
+            <a:ext cx="6879102" cy="523220"/>
+          </a:xfrm>
+          <a:prstGeom prst="rect">
+            <a:avLst/>
+          </a:prstGeom>
+          <a:noFill/>
+        </p:spPr>
+        <p:txBody>
+          <a:bodyPr wrap="square" rtlCol="0">
+            <a:spAutoFit/>
+          </a:bodyPr>
+          <a:lstStyle/>
+          <a:p>
+            <a:pPr algn="ctr"/>
+            <a:r>
+              <a:rPr lang="es-ES" sz="2800" b="1" dirty="0" smtClean="0">
+                <a:solidFill>
+                  <a:srgbClr val="0070C0"/>
+                </a:solidFill>
+                <a:latin typeface="Arial" panose="020B0604020202020204" pitchFamily="34" charset="0"/>
+                <a:cs typeface="Arial" panose="020B0604020202020204" pitchFamily="34" charset="0"/>
+              </a:rPr>
+              <a:t>ANEXOS</a:t>
+            </a:r>
+            <a:endParaRPr lang="es-CO" sz="2800" b="1" dirty="0">
+              <a:solidFill>
+                <a:srgbClr val="0070C0"/>
+              </a:solidFill>
+              <a:latin typeface="Arial" panose="020B0604020202020204" pitchFamily="34" charset="0"/>
+              <a:cs typeface="Arial" panose="020B0604020202020204" pitchFamily="34" charset="0"/>
+            </a:endParaRPr>
+          </a:p>
+        </p:txBody>
+      </p:sp>
+      <p:sp>
+        <p:nvSpPr>
+          <p:cNvPr id="5" name="CuadroTexto 4">
+            <a:hlinkClick r:id="rId3" action="ppaction://hlinkfile"/>
+            <a:extLst>
+              <a:ext uri="{FF2B5EF4-FFF2-40B4-BE49-F238E27FC236}">
+                <a16:creationId xmlns:a16="http://schemas.microsoft.com/office/drawing/2014/main" id="{03EC8784-F841-4BD9-8443-3B6F41DC20A4}"/>
+              </a:ext>
+            </a:extLst>
+          </p:cNvPr>
+          <p:cNvSpPr txBox="1"/>
+          <p:nvPr/>
+        </p:nvSpPr>
+        <p:spPr>
+          <a:xfrm>
+            <a:off x="477449" y="1419771"/>
+            <a:ext cx="9791114" cy="369332"/>
+          </a:xfrm>
+          <a:prstGeom prst="rect">
+            <a:avLst/>
+          </a:prstGeom>
+          <a:noFill/>
+        </p:spPr>
+        <p:txBody>
+          <a:bodyPr wrap="square" rtlCol="0">
+            <a:spAutoFit/>
+          </a:bodyPr>
+          <a:lstStyle/>
+          <a:p>
+            <a:pPr algn="just"/>
+            <a:r>
+              <a:rPr lang="es-ES" dirty="0" smtClean="0">
+                <a:solidFill>
+                  <a:srgbClr val="0070C0"/>
+                </a:solidFill>
+                <a:latin typeface="Arial" panose="020B0604020202020204" pitchFamily="34" charset="0"/>
+                <a:cs typeface="Arial" panose="020B0604020202020204" pitchFamily="34" charset="0"/>
+              </a:rPr>
+              <a:t>DOCUMENTO IEEE830 </a:t>
+            </a:r>
+          </a:p>
+        </p:txBody>
+      </p:sp>
+      <p:sp>
+        <p:nvSpPr>
+          <p:cNvPr id="3" name="CuadroTexto 2">
+            <a:hlinkClick r:id="rId4"/>
+          </p:cNvPr>
+          <p:cNvSpPr txBox="1"/>
+          <p:nvPr/>
+        </p:nvSpPr>
+        <p:spPr>
+          <a:xfrm>
+            <a:off x="477449" y="2563091"/>
+            <a:ext cx="4094551" cy="369332"/>
+          </a:xfrm>
+          <a:prstGeom prst="rect">
+            <a:avLst/>
+          </a:prstGeom>
+          <a:noFill/>
+        </p:spPr>
+        <p:txBody>
+          <a:bodyPr wrap="square" rtlCol="0">
+            <a:spAutoFit/>
+          </a:bodyPr>
+          <a:lstStyle/>
+          <a:p>
+            <a:r>
+              <a:rPr lang="es-CO" dirty="0" smtClean="0">
+                <a:solidFill>
+                  <a:srgbClr val="0070C0"/>
+                </a:solidFill>
+                <a:latin typeface="Arial" panose="020B0604020202020204" pitchFamily="34" charset="0"/>
+                <a:cs typeface="Arial" panose="020B0604020202020204" pitchFamily="34" charset="0"/>
+              </a:rPr>
+              <a:t>DOCUMENTO DE INVESTIGACION</a:t>
+            </a:r>
+            <a:endParaRPr lang="en-US" dirty="0">
+              <a:solidFill>
+                <a:srgbClr val="0070C0"/>
+              </a:solidFill>
+              <a:latin typeface="Arial" panose="020B0604020202020204" pitchFamily="34" charset="0"/>
+              <a:cs typeface="Arial" panose="020B0604020202020204" pitchFamily="34" charset="0"/>
+            </a:endParaRPr>
+          </a:p>
+        </p:txBody>
+      </p:sp>
+    </p:spTree>
+    <p:extLst>
+      <p:ext uri="{BB962C8B-B14F-4D97-AF65-F5344CB8AC3E}">
+        <p14:creationId xmlns:p14="http://schemas.microsoft.com/office/powerpoint/2010/main" val="2006625067"/>
+      </p:ext>
+    </p:extLst>
+  </p:cSld>
+  <p:clrMapOvr>
+    <a:masterClrMapping/>
+  </p:clrMapOvr>
+</p:sld>
+</file>
+
+<file path=ppt/slides/slide25.xml><?xml version="1.0" encoding="utf-8"?>
 <p:sld xmlns:a="http://schemas.openxmlformats.org/drawingml/2006/main" xmlns:r="http://schemas.openxmlformats.org/officeDocument/2006/relationships" xmlns:p="http://schemas.openxmlformats.org/presentationml/2006/main">
   <p:cSld>
     <p:spTree>

</xml_diff>